<commit_message>
Update Test Automation frameworks deck
</commit_message>
<xml_diff>
--- a/TestAutomationFramework/TestingAutomationFramework.pptx
+++ b/TestAutomationFramework/TestingAutomationFramework.pptx
@@ -5,12 +5,20 @@
     <p:sldMasterId id="2147483660" r:id="rId1"/>
   </p:sldMasterIdLst>
   <p:notesMasterIdLst>
-    <p:notesMasterId r:id="rId5"/>
+    <p:notesMasterId r:id="rId13"/>
   </p:notesMasterIdLst>
   <p:sldIdLst>
     <p:sldId id="526" r:id="rId2"/>
     <p:sldId id="256" r:id="rId3"/>
-    <p:sldId id="272" r:id="rId4"/>
+    <p:sldId id="527" r:id="rId4"/>
+    <p:sldId id="272" r:id="rId5"/>
+    <p:sldId id="528" r:id="rId6"/>
+    <p:sldId id="529" r:id="rId7"/>
+    <p:sldId id="530" r:id="rId8"/>
+    <p:sldId id="535" r:id="rId9"/>
+    <p:sldId id="531" r:id="rId10"/>
+    <p:sldId id="533" r:id="rId11"/>
+    <p:sldId id="534" r:id="rId12"/>
   </p:sldIdLst>
   <p:sldSz cx="12192000" cy="6858000"/>
   <p:notesSz cx="6858000" cy="9144000"/>
@@ -119,7 +127,15 @@
           <p14:sldIdLst>
             <p14:sldId id="526"/>
             <p14:sldId id="256"/>
+            <p14:sldId id="527"/>
             <p14:sldId id="272"/>
+            <p14:sldId id="528"/>
+            <p14:sldId id="529"/>
+            <p14:sldId id="530"/>
+            <p14:sldId id="535"/>
+            <p14:sldId id="531"/>
+            <p14:sldId id="533"/>
+            <p14:sldId id="534"/>
           </p14:sldIdLst>
         </p14:section>
       </p14:sectionLst>
@@ -225,7 +241,7 @@
           <a:p>
             <a:fld id="{58C2BD4A-D40A-42C5-976D-406EE7EC3204}" type="datetimeFigureOut">
               <a:rPr lang="en-US" smtClean="0"/>
-              <a:t>24-Nov-20</a:t>
+              <a:t>25-Nov-20</a:t>
             </a:fld>
             <a:endParaRPr lang="en-US"/>
           </a:p>
@@ -12198,6 +12214,126 @@
 </p:sld>
 </file>
 
+<file path=ppt/slides/slide10.xml><?xml version="1.0" encoding="utf-8"?>
+<p:sld xmlns:a="http://schemas.openxmlformats.org/drawingml/2006/main" xmlns:r="http://schemas.openxmlformats.org/officeDocument/2006/relationships" xmlns:p="http://schemas.openxmlformats.org/presentationml/2006/main">
+  <p:cSld>
+    <p:spTree>
+      <p:nvGrpSpPr>
+        <p:cNvPr id="1" name=""/>
+        <p:cNvGrpSpPr/>
+        <p:nvPr/>
+      </p:nvGrpSpPr>
+      <p:grpSpPr>
+        <a:xfrm>
+          <a:off x="0" y="0"/>
+          <a:ext cx="0" cy="0"/>
+          <a:chOff x="0" y="0"/>
+          <a:chExt cx="0" cy="0"/>
+        </a:xfrm>
+      </p:grpSpPr>
+      <p:sp>
+        <p:nvSpPr>
+          <p:cNvPr id="2" name="Title 1">
+            <a:extLst>
+              <a:ext uri="{FF2B5EF4-FFF2-40B4-BE49-F238E27FC236}">
+                <a16:creationId xmlns:a16="http://schemas.microsoft.com/office/drawing/2014/main" id="{0D157F11-29CC-473A-B5A3-CC53D182D2B8}"/>
+              </a:ext>
+            </a:extLst>
+          </p:cNvPr>
+          <p:cNvSpPr>
+            <a:spLocks noGrp="1"/>
+          </p:cNvSpPr>
+          <p:nvPr>
+            <p:ph type="title"/>
+          </p:nvPr>
+        </p:nvSpPr>
+        <p:spPr/>
+        <p:txBody>
+          <a:bodyPr>
+            <a:normAutofit fontScale="90000"/>
+          </a:bodyPr>
+          <a:lstStyle/>
+          <a:p>
+            <a:r>
+              <a:rPr lang="en-AU" dirty="0"/>
+              <a:t>Keyword driven framework – A walkthrough</a:t>
+            </a:r>
+          </a:p>
+        </p:txBody>
+      </p:sp>
+    </p:spTree>
+    <p:extLst>
+      <p:ext uri="{BB962C8B-B14F-4D97-AF65-F5344CB8AC3E}">
+        <p14:creationId xmlns:p14="http://schemas.microsoft.com/office/powerpoint/2010/main" val="3054093639"/>
+      </p:ext>
+    </p:extLst>
+  </p:cSld>
+  <p:clrMapOvr>
+    <a:masterClrMapping/>
+  </p:clrMapOvr>
+</p:sld>
+</file>
+
+<file path=ppt/slides/slide11.xml><?xml version="1.0" encoding="utf-8"?>
+<p:sld xmlns:a="http://schemas.openxmlformats.org/drawingml/2006/main" xmlns:r="http://schemas.openxmlformats.org/officeDocument/2006/relationships" xmlns:p="http://schemas.openxmlformats.org/presentationml/2006/main">
+  <p:cSld>
+    <p:spTree>
+      <p:nvGrpSpPr>
+        <p:cNvPr id="1" name=""/>
+        <p:cNvGrpSpPr/>
+        <p:nvPr/>
+      </p:nvGrpSpPr>
+      <p:grpSpPr>
+        <a:xfrm>
+          <a:off x="0" y="0"/>
+          <a:ext cx="0" cy="0"/>
+          <a:chOff x="0" y="0"/>
+          <a:chExt cx="0" cy="0"/>
+        </a:xfrm>
+      </p:grpSpPr>
+      <p:sp>
+        <p:nvSpPr>
+          <p:cNvPr id="2" name="Title 1">
+            <a:extLst>
+              <a:ext uri="{FF2B5EF4-FFF2-40B4-BE49-F238E27FC236}">
+                <a16:creationId xmlns:a16="http://schemas.microsoft.com/office/drawing/2014/main" id="{0D157F11-29CC-473A-B5A3-CC53D182D2B8}"/>
+              </a:ext>
+            </a:extLst>
+          </p:cNvPr>
+          <p:cNvSpPr>
+            <a:spLocks noGrp="1"/>
+          </p:cNvSpPr>
+          <p:nvPr>
+            <p:ph type="title"/>
+          </p:nvPr>
+        </p:nvSpPr>
+        <p:spPr/>
+        <p:txBody>
+          <a:bodyPr>
+            <a:normAutofit/>
+          </a:bodyPr>
+          <a:lstStyle/>
+          <a:p>
+            <a:r>
+              <a:rPr lang="en-AU" dirty="0"/>
+              <a:t>Hybrid framework – A walkthrough</a:t>
+            </a:r>
+          </a:p>
+        </p:txBody>
+      </p:sp>
+    </p:spTree>
+    <p:extLst>
+      <p:ext uri="{BB962C8B-B14F-4D97-AF65-F5344CB8AC3E}">
+        <p14:creationId xmlns:p14="http://schemas.microsoft.com/office/powerpoint/2010/main" val="3073782683"/>
+      </p:ext>
+    </p:extLst>
+  </p:cSld>
+  <p:clrMapOvr>
+    <a:masterClrMapping/>
+  </p:clrMapOvr>
+</p:sld>
+</file>
+
 <file path=ppt/slides/slide2.xml><?xml version="1.0" encoding="utf-8"?>
 <p:sld xmlns:a="http://schemas.openxmlformats.org/drawingml/2006/main" xmlns:r="http://schemas.openxmlformats.org/officeDocument/2006/relationships" xmlns:p="http://schemas.openxmlformats.org/presentationml/2006/main">
   <p:cSld>
@@ -12802,6 +12938,125 @@
 </file>
 
 <file path=ppt/slides/slide3.xml><?xml version="1.0" encoding="utf-8"?>
+<p:sld xmlns:a="http://schemas.openxmlformats.org/drawingml/2006/main" xmlns:r="http://schemas.openxmlformats.org/officeDocument/2006/relationships" xmlns:p="http://schemas.openxmlformats.org/presentationml/2006/main">
+  <p:cSld>
+    <p:spTree>
+      <p:nvGrpSpPr>
+        <p:cNvPr id="1" name=""/>
+        <p:cNvGrpSpPr/>
+        <p:nvPr/>
+      </p:nvGrpSpPr>
+      <p:grpSpPr>
+        <a:xfrm>
+          <a:off x="0" y="0"/>
+          <a:ext cx="0" cy="0"/>
+          <a:chOff x="0" y="0"/>
+          <a:chExt cx="0" cy="0"/>
+        </a:xfrm>
+      </p:grpSpPr>
+      <p:sp>
+        <p:nvSpPr>
+          <p:cNvPr id="2" name="Title 1">
+            <a:extLst>
+              <a:ext uri="{FF2B5EF4-FFF2-40B4-BE49-F238E27FC236}">
+                <a16:creationId xmlns:a16="http://schemas.microsoft.com/office/drawing/2014/main" id="{599CD04C-9383-45F5-A98E-15D5E32D9D5D}"/>
+              </a:ext>
+            </a:extLst>
+          </p:cNvPr>
+          <p:cNvSpPr>
+            <a:spLocks noGrp="1"/>
+          </p:cNvSpPr>
+          <p:nvPr>
+            <p:ph type="title"/>
+          </p:nvPr>
+        </p:nvSpPr>
+        <p:spPr/>
+        <p:txBody>
+          <a:bodyPr/>
+          <a:lstStyle/>
+          <a:p>
+            <a:r>
+              <a:rPr lang="en-US" dirty="0"/>
+              <a:t>Takeaway</a:t>
+            </a:r>
+          </a:p>
+        </p:txBody>
+      </p:sp>
+      <p:sp>
+        <p:nvSpPr>
+          <p:cNvPr id="3" name="Rectangle 2">
+            <a:extLst>
+              <a:ext uri="{FF2B5EF4-FFF2-40B4-BE49-F238E27FC236}">
+                <a16:creationId xmlns:a16="http://schemas.microsoft.com/office/drawing/2014/main" id="{B135E980-36DF-4448-B267-422DC08717CE}"/>
+              </a:ext>
+            </a:extLst>
+          </p:cNvPr>
+          <p:cNvSpPr/>
+          <p:nvPr/>
+        </p:nvSpPr>
+        <p:spPr>
+          <a:xfrm>
+            <a:off x="757286" y="1559839"/>
+            <a:ext cx="6096000" cy="2308324"/>
+          </a:xfrm>
+          <a:prstGeom prst="rect">
+            <a:avLst/>
+          </a:prstGeom>
+        </p:spPr>
+        <p:txBody>
+          <a:bodyPr>
+            <a:spAutoFit/>
+          </a:bodyPr>
+          <a:lstStyle/>
+          <a:p>
+            <a:r>
+              <a:rPr lang="en-US" dirty="0"/>
+              <a:t>By End of this session. You will be able to understand the framework.</a:t>
+            </a:r>
+          </a:p>
+          <a:p>
+            <a:endParaRPr lang="en-US" dirty="0"/>
+          </a:p>
+          <a:p>
+            <a:r>
+              <a:rPr lang="en-US" dirty="0"/>
+              <a:t>Different types of Frameworks</a:t>
+            </a:r>
+          </a:p>
+          <a:p>
+            <a:endParaRPr lang="en-US" dirty="0"/>
+          </a:p>
+          <a:p>
+            <a:r>
+              <a:rPr lang="en-US" dirty="0"/>
+              <a:t>Create a framework from scratch.</a:t>
+            </a:r>
+          </a:p>
+          <a:p>
+            <a:endParaRPr lang="en-US" dirty="0"/>
+          </a:p>
+          <a:p>
+            <a:r>
+              <a:rPr lang="en-US" dirty="0"/>
+              <a:t>Different types of Reporting in the Frameworks.</a:t>
+            </a:r>
+          </a:p>
+        </p:txBody>
+      </p:sp>
+    </p:spTree>
+    <p:extLst>
+      <p:ext uri="{BB962C8B-B14F-4D97-AF65-F5344CB8AC3E}">
+        <p14:creationId xmlns:p14="http://schemas.microsoft.com/office/powerpoint/2010/main" val="3338446980"/>
+      </p:ext>
+    </p:extLst>
+  </p:cSld>
+  <p:clrMapOvr>
+    <a:masterClrMapping/>
+  </p:clrMapOvr>
+</p:sld>
+</file>
+
+<file path=ppt/slides/slide4.xml><?xml version="1.0" encoding="utf-8"?>
 <p:sld xmlns:a="http://schemas.openxmlformats.org/drawingml/2006/main" xmlns:r="http://schemas.openxmlformats.org/officeDocument/2006/relationships" xmlns:p="http://schemas.openxmlformats.org/presentationml/2006/main">
   <p:cSld>
     <p:spTree>
@@ -15813,6 +16068,3353 @@
     <p:extLst>
       <p:ext uri="{BB962C8B-B14F-4D97-AF65-F5344CB8AC3E}">
         <p14:creationId xmlns:p14="http://schemas.microsoft.com/office/powerpoint/2010/main" val="3324736890"/>
+      </p:ext>
+    </p:extLst>
+  </p:cSld>
+  <p:clrMapOvr>
+    <a:masterClrMapping/>
+  </p:clrMapOvr>
+</p:sld>
+</file>
+
+<file path=ppt/slides/slide5.xml><?xml version="1.0" encoding="utf-8"?>
+<p:sld xmlns:a="http://schemas.openxmlformats.org/drawingml/2006/main" xmlns:r="http://schemas.openxmlformats.org/officeDocument/2006/relationships" xmlns:p="http://schemas.openxmlformats.org/presentationml/2006/main">
+  <p:cSld>
+    <p:spTree>
+      <p:nvGrpSpPr>
+        <p:cNvPr id="1" name=""/>
+        <p:cNvGrpSpPr/>
+        <p:nvPr/>
+      </p:nvGrpSpPr>
+      <p:grpSpPr>
+        <a:xfrm>
+          <a:off x="0" y="0"/>
+          <a:ext cx="0" cy="0"/>
+          <a:chOff x="0" y="0"/>
+          <a:chExt cx="0" cy="0"/>
+        </a:xfrm>
+      </p:grpSpPr>
+      <p:sp>
+        <p:nvSpPr>
+          <p:cNvPr id="2" name="Title 1">
+            <a:extLst>
+              <a:ext uri="{FF2B5EF4-FFF2-40B4-BE49-F238E27FC236}">
+                <a16:creationId xmlns:a16="http://schemas.microsoft.com/office/drawing/2014/main" id="{0D157F11-29CC-473A-B5A3-CC53D182D2B8}"/>
+              </a:ext>
+            </a:extLst>
+          </p:cNvPr>
+          <p:cNvSpPr>
+            <a:spLocks noGrp="1"/>
+          </p:cNvSpPr>
+          <p:nvPr>
+            <p:ph type="title"/>
+          </p:nvPr>
+        </p:nvSpPr>
+        <p:spPr/>
+        <p:txBody>
+          <a:bodyPr/>
+          <a:lstStyle/>
+          <a:p>
+            <a:r>
+              <a:rPr lang="en-AU" dirty="0"/>
+              <a:t>Keyword driven framework</a:t>
+            </a:r>
+          </a:p>
+        </p:txBody>
+      </p:sp>
+      <p:sp>
+        <p:nvSpPr>
+          <p:cNvPr id="4" name="Rectangle 3">
+            <a:extLst>
+              <a:ext uri="{FF2B5EF4-FFF2-40B4-BE49-F238E27FC236}">
+                <a16:creationId xmlns:a16="http://schemas.microsoft.com/office/drawing/2014/main" id="{E4AD2ED0-2B36-40BB-BC0A-F3FEB8EC9E27}"/>
+              </a:ext>
+            </a:extLst>
+          </p:cNvPr>
+          <p:cNvSpPr/>
+          <p:nvPr/>
+        </p:nvSpPr>
+        <p:spPr>
+          <a:xfrm>
+            <a:off x="2595482" y="1211563"/>
+            <a:ext cx="6776477" cy="707886"/>
+          </a:xfrm>
+          <a:prstGeom prst="rect">
+            <a:avLst/>
+          </a:prstGeom>
+        </p:spPr>
+        <p:txBody>
+          <a:bodyPr wrap="square">
+            <a:spAutoFit/>
+          </a:bodyPr>
+          <a:lstStyle/>
+          <a:p>
+            <a:pPr algn="ctr"/>
+            <a:r>
+              <a:rPr lang="en-US" sz="2000" dirty="0">
+                <a:latin typeface="+mj-lt"/>
+              </a:rPr>
+              <a:t>Framework consists of a set/collection of keywords that are used to develop test scripts.</a:t>
+            </a:r>
+          </a:p>
+        </p:txBody>
+      </p:sp>
+      <p:sp>
+        <p:nvSpPr>
+          <p:cNvPr id="26" name="Rectangle: Rounded Corners 25">
+            <a:extLst>
+              <a:ext uri="{FF2B5EF4-FFF2-40B4-BE49-F238E27FC236}">
+                <a16:creationId xmlns:a16="http://schemas.microsoft.com/office/drawing/2014/main" id="{D7D59738-5DD8-4028-B032-0292DB6BC34A}"/>
+              </a:ext>
+            </a:extLst>
+          </p:cNvPr>
+          <p:cNvSpPr/>
+          <p:nvPr/>
+        </p:nvSpPr>
+        <p:spPr>
+          <a:xfrm>
+            <a:off x="1816021" y="5055357"/>
+            <a:ext cx="958701" cy="580238"/>
+          </a:xfrm>
+          <a:prstGeom prst="roundRect">
+            <a:avLst/>
+          </a:prstGeom>
+        </p:spPr>
+        <p:style>
+          <a:lnRef idx="2">
+            <a:schemeClr val="accent1">
+              <a:shade val="50000"/>
+            </a:schemeClr>
+          </a:lnRef>
+          <a:fillRef idx="1">
+            <a:schemeClr val="accent1"/>
+          </a:fillRef>
+          <a:effectRef idx="0">
+            <a:schemeClr val="accent1"/>
+          </a:effectRef>
+          <a:fontRef idx="minor">
+            <a:schemeClr val="lt1"/>
+          </a:fontRef>
+        </p:style>
+        <p:txBody>
+          <a:bodyPr rtlCol="0" anchor="ctr"/>
+          <a:lstStyle/>
+          <a:p>
+            <a:pPr algn="ctr"/>
+            <a:r>
+              <a:rPr lang="en-US" sz="1100" dirty="0"/>
+              <a:t>Operation Classes</a:t>
+            </a:r>
+          </a:p>
+        </p:txBody>
+      </p:sp>
+      <p:sp>
+        <p:nvSpPr>
+          <p:cNvPr id="32" name="Rectangle: Rounded Corners 31">
+            <a:extLst>
+              <a:ext uri="{FF2B5EF4-FFF2-40B4-BE49-F238E27FC236}">
+                <a16:creationId xmlns:a16="http://schemas.microsoft.com/office/drawing/2014/main" id="{116F9C0A-FC83-4074-8276-38AAFC6F6C0D}"/>
+              </a:ext>
+            </a:extLst>
+          </p:cNvPr>
+          <p:cNvSpPr/>
+          <p:nvPr/>
+        </p:nvSpPr>
+        <p:spPr>
+          <a:xfrm>
+            <a:off x="3609401" y="3353418"/>
+            <a:ext cx="958701" cy="580238"/>
+          </a:xfrm>
+          <a:prstGeom prst="roundRect">
+            <a:avLst/>
+          </a:prstGeom>
+        </p:spPr>
+        <p:style>
+          <a:lnRef idx="2">
+            <a:schemeClr val="accent1">
+              <a:shade val="50000"/>
+            </a:schemeClr>
+          </a:lnRef>
+          <a:fillRef idx="1">
+            <a:schemeClr val="accent1"/>
+          </a:fillRef>
+          <a:effectRef idx="0">
+            <a:schemeClr val="accent1"/>
+          </a:effectRef>
+          <a:fontRef idx="minor">
+            <a:schemeClr val="lt1"/>
+          </a:fontRef>
+        </p:style>
+        <p:txBody>
+          <a:bodyPr rtlCol="0" anchor="ctr"/>
+          <a:lstStyle/>
+          <a:p>
+            <a:pPr algn="ctr"/>
+            <a:r>
+              <a:rPr lang="en-US" sz="1100" dirty="0"/>
+              <a:t>Data source (Excel)</a:t>
+            </a:r>
+          </a:p>
+        </p:txBody>
+      </p:sp>
+      <p:sp>
+        <p:nvSpPr>
+          <p:cNvPr id="33" name="Rectangle: Rounded Corners 32">
+            <a:extLst>
+              <a:ext uri="{FF2B5EF4-FFF2-40B4-BE49-F238E27FC236}">
+                <a16:creationId xmlns:a16="http://schemas.microsoft.com/office/drawing/2014/main" id="{D58389B8-82A1-4642-B369-38DB86597E95}"/>
+              </a:ext>
+            </a:extLst>
+          </p:cNvPr>
+          <p:cNvSpPr/>
+          <p:nvPr/>
+        </p:nvSpPr>
+        <p:spPr>
+          <a:xfrm>
+            <a:off x="4144713" y="4979935"/>
+            <a:ext cx="958701" cy="580238"/>
+          </a:xfrm>
+          <a:prstGeom prst="roundRect">
+            <a:avLst/>
+          </a:prstGeom>
+        </p:spPr>
+        <p:style>
+          <a:lnRef idx="2">
+            <a:schemeClr val="accent1">
+              <a:shade val="50000"/>
+            </a:schemeClr>
+          </a:lnRef>
+          <a:fillRef idx="1">
+            <a:schemeClr val="accent1"/>
+          </a:fillRef>
+          <a:effectRef idx="0">
+            <a:schemeClr val="accent1"/>
+          </a:effectRef>
+          <a:fontRef idx="minor">
+            <a:schemeClr val="lt1"/>
+          </a:fontRef>
+        </p:style>
+        <p:txBody>
+          <a:bodyPr rtlCol="0" anchor="ctr"/>
+          <a:lstStyle/>
+          <a:p>
+            <a:pPr algn="ctr"/>
+            <a:r>
+              <a:rPr lang="en-US" sz="1100" dirty="0"/>
+              <a:t>Object repository</a:t>
+            </a:r>
+          </a:p>
+        </p:txBody>
+      </p:sp>
+      <p:sp>
+        <p:nvSpPr>
+          <p:cNvPr id="35" name="Rectangle: Rounded Corners 34">
+            <a:extLst>
+              <a:ext uri="{FF2B5EF4-FFF2-40B4-BE49-F238E27FC236}">
+                <a16:creationId xmlns:a16="http://schemas.microsoft.com/office/drawing/2014/main" id="{F5861959-96F1-46F5-8CF4-4E960B840B9E}"/>
+              </a:ext>
+            </a:extLst>
+          </p:cNvPr>
+          <p:cNvSpPr/>
+          <p:nvPr/>
+        </p:nvSpPr>
+        <p:spPr>
+          <a:xfrm>
+            <a:off x="5616649" y="3353418"/>
+            <a:ext cx="958701" cy="580238"/>
+          </a:xfrm>
+          <a:prstGeom prst="roundRect">
+            <a:avLst/>
+          </a:prstGeom>
+        </p:spPr>
+        <p:style>
+          <a:lnRef idx="2">
+            <a:schemeClr val="accent1">
+              <a:shade val="50000"/>
+            </a:schemeClr>
+          </a:lnRef>
+          <a:fillRef idx="1">
+            <a:schemeClr val="accent1"/>
+          </a:fillRef>
+          <a:effectRef idx="0">
+            <a:schemeClr val="accent1"/>
+          </a:effectRef>
+          <a:fontRef idx="minor">
+            <a:schemeClr val="lt1"/>
+          </a:fontRef>
+        </p:style>
+        <p:txBody>
+          <a:bodyPr rtlCol="0" anchor="ctr"/>
+          <a:lstStyle/>
+          <a:p>
+            <a:pPr algn="ctr"/>
+            <a:r>
+              <a:rPr lang="en-US" sz="1100" dirty="0"/>
+              <a:t>Keywords repo (library)</a:t>
+            </a:r>
+          </a:p>
+        </p:txBody>
+      </p:sp>
+      <p:sp>
+        <p:nvSpPr>
+          <p:cNvPr id="8" name="Arrow: Curved Left 7">
+            <a:extLst>
+              <a:ext uri="{FF2B5EF4-FFF2-40B4-BE49-F238E27FC236}">
+                <a16:creationId xmlns:a16="http://schemas.microsoft.com/office/drawing/2014/main" id="{777655E9-6DFD-41C2-B948-8EB6E74462B0}"/>
+              </a:ext>
+            </a:extLst>
+          </p:cNvPr>
+          <p:cNvSpPr/>
+          <p:nvPr/>
+        </p:nvSpPr>
+        <p:spPr>
+          <a:xfrm rot="16200000">
+            <a:off x="2837345" y="2046050"/>
+            <a:ext cx="657291" cy="1957445"/>
+          </a:xfrm>
+          <a:prstGeom prst="curvedLeftArrow">
+            <a:avLst/>
+          </a:prstGeom>
+        </p:spPr>
+        <p:style>
+          <a:lnRef idx="2">
+            <a:schemeClr val="accent1">
+              <a:shade val="50000"/>
+            </a:schemeClr>
+          </a:lnRef>
+          <a:fillRef idx="1">
+            <a:schemeClr val="accent1"/>
+          </a:fillRef>
+          <a:effectRef idx="0">
+            <a:schemeClr val="accent1"/>
+          </a:effectRef>
+          <a:fontRef idx="minor">
+            <a:schemeClr val="lt1"/>
+          </a:fontRef>
+        </p:style>
+        <p:txBody>
+          <a:bodyPr rtlCol="0" anchor="ctr"/>
+          <a:lstStyle/>
+          <a:p>
+            <a:pPr algn="ctr"/>
+            <a:endParaRPr lang="en-US">
+              <a:solidFill>
+                <a:schemeClr val="tx1"/>
+              </a:solidFill>
+            </a:endParaRPr>
+          </a:p>
+        </p:txBody>
+      </p:sp>
+      <p:sp>
+        <p:nvSpPr>
+          <p:cNvPr id="36" name="Arrow: Curved Left 35">
+            <a:extLst>
+              <a:ext uri="{FF2B5EF4-FFF2-40B4-BE49-F238E27FC236}">
+                <a16:creationId xmlns:a16="http://schemas.microsoft.com/office/drawing/2014/main" id="{4A135FB2-0A7E-4641-9383-36B761D95199}"/>
+              </a:ext>
+            </a:extLst>
+          </p:cNvPr>
+          <p:cNvSpPr/>
+          <p:nvPr/>
+        </p:nvSpPr>
+        <p:spPr>
+          <a:xfrm flipH="1">
+            <a:off x="969150" y="3598158"/>
+            <a:ext cx="846871" cy="1962015"/>
+          </a:xfrm>
+          <a:prstGeom prst="curvedLeftArrow">
+            <a:avLst/>
+          </a:prstGeom>
+        </p:spPr>
+        <p:style>
+          <a:lnRef idx="2">
+            <a:schemeClr val="accent1">
+              <a:shade val="50000"/>
+            </a:schemeClr>
+          </a:lnRef>
+          <a:fillRef idx="1">
+            <a:schemeClr val="accent1"/>
+          </a:fillRef>
+          <a:effectRef idx="0">
+            <a:schemeClr val="accent1"/>
+          </a:effectRef>
+          <a:fontRef idx="minor">
+            <a:schemeClr val="lt1"/>
+          </a:fontRef>
+        </p:style>
+        <p:txBody>
+          <a:bodyPr rtlCol="0" anchor="ctr"/>
+          <a:lstStyle/>
+          <a:p>
+            <a:pPr algn="ctr"/>
+            <a:endParaRPr lang="en-US">
+              <a:solidFill>
+                <a:schemeClr val="tx1"/>
+              </a:solidFill>
+            </a:endParaRPr>
+          </a:p>
+        </p:txBody>
+      </p:sp>
+      <p:sp>
+        <p:nvSpPr>
+          <p:cNvPr id="3" name="Rectangle: Rounded Corners 2">
+            <a:extLst>
+              <a:ext uri="{FF2B5EF4-FFF2-40B4-BE49-F238E27FC236}">
+                <a16:creationId xmlns:a16="http://schemas.microsoft.com/office/drawing/2014/main" id="{0FD910C4-2E77-4C78-A278-6CF58B5A158D}"/>
+              </a:ext>
+            </a:extLst>
+          </p:cNvPr>
+          <p:cNvSpPr/>
+          <p:nvPr/>
+        </p:nvSpPr>
+        <p:spPr>
+          <a:xfrm>
+            <a:off x="1763879" y="3353418"/>
+            <a:ext cx="958701" cy="580238"/>
+          </a:xfrm>
+          <a:prstGeom prst="roundRect">
+            <a:avLst/>
+          </a:prstGeom>
+        </p:spPr>
+        <p:style>
+          <a:lnRef idx="2">
+            <a:schemeClr val="accent1">
+              <a:shade val="50000"/>
+            </a:schemeClr>
+          </a:lnRef>
+          <a:fillRef idx="1">
+            <a:schemeClr val="accent1"/>
+          </a:fillRef>
+          <a:effectRef idx="0">
+            <a:schemeClr val="accent1"/>
+          </a:effectRef>
+          <a:fontRef idx="minor">
+            <a:schemeClr val="lt1"/>
+          </a:fontRef>
+        </p:style>
+        <p:txBody>
+          <a:bodyPr rtlCol="0" anchor="ctr"/>
+          <a:lstStyle/>
+          <a:p>
+            <a:pPr algn="ctr"/>
+            <a:r>
+              <a:rPr lang="en-US" sz="1100" dirty="0"/>
+              <a:t>Test Executor</a:t>
+            </a:r>
+          </a:p>
+        </p:txBody>
+      </p:sp>
+      <p:sp>
+        <p:nvSpPr>
+          <p:cNvPr id="37" name="Rectangle 36">
+            <a:extLst>
+              <a:ext uri="{FF2B5EF4-FFF2-40B4-BE49-F238E27FC236}">
+                <a16:creationId xmlns:a16="http://schemas.microsoft.com/office/drawing/2014/main" id="{732B7B7B-0824-426B-B14A-B775FBBE46FA}"/>
+              </a:ext>
+            </a:extLst>
+          </p:cNvPr>
+          <p:cNvSpPr/>
+          <p:nvPr/>
+        </p:nvSpPr>
+        <p:spPr>
+          <a:xfrm rot="10800000" flipV="1">
+            <a:off x="3366233" y="2690106"/>
+            <a:ext cx="2480879" cy="246221"/>
+          </a:xfrm>
+          <a:prstGeom prst="rect">
+            <a:avLst/>
+          </a:prstGeom>
+        </p:spPr>
+        <p:txBody>
+          <a:bodyPr wrap="square">
+            <a:spAutoFit/>
+          </a:bodyPr>
+          <a:lstStyle/>
+          <a:p>
+            <a:pPr algn="ctr"/>
+            <a:r>
+              <a:rPr lang="en-US" sz="1000" dirty="0">
+                <a:latin typeface="+mj-lt"/>
+              </a:rPr>
+              <a:t>Reads the Data from Data source</a:t>
+            </a:r>
+          </a:p>
+        </p:txBody>
+      </p:sp>
+      <p:sp>
+        <p:nvSpPr>
+          <p:cNvPr id="38" name="Arrow: Curved Left 37">
+            <a:extLst>
+              <a:ext uri="{FF2B5EF4-FFF2-40B4-BE49-F238E27FC236}">
+                <a16:creationId xmlns:a16="http://schemas.microsoft.com/office/drawing/2014/main" id="{B85A9AAB-CD42-44B2-ACBC-4A4BDAEAEB1F}"/>
+              </a:ext>
+            </a:extLst>
+          </p:cNvPr>
+          <p:cNvSpPr/>
+          <p:nvPr/>
+        </p:nvSpPr>
+        <p:spPr>
+          <a:xfrm rot="16200000">
+            <a:off x="3784169" y="823816"/>
+            <a:ext cx="891054" cy="4143231"/>
+          </a:xfrm>
+          <a:prstGeom prst="curvedLeftArrow">
+            <a:avLst/>
+          </a:prstGeom>
+        </p:spPr>
+        <p:style>
+          <a:lnRef idx="2">
+            <a:schemeClr val="accent1">
+              <a:shade val="50000"/>
+            </a:schemeClr>
+          </a:lnRef>
+          <a:fillRef idx="1">
+            <a:schemeClr val="accent1"/>
+          </a:fillRef>
+          <a:effectRef idx="0">
+            <a:schemeClr val="accent1"/>
+          </a:effectRef>
+          <a:fontRef idx="minor">
+            <a:schemeClr val="lt1"/>
+          </a:fontRef>
+        </p:style>
+        <p:txBody>
+          <a:bodyPr rtlCol="0" anchor="ctr"/>
+          <a:lstStyle/>
+          <a:p>
+            <a:pPr algn="ctr"/>
+            <a:endParaRPr lang="en-US">
+              <a:solidFill>
+                <a:schemeClr val="tx1"/>
+              </a:solidFill>
+            </a:endParaRPr>
+          </a:p>
+        </p:txBody>
+      </p:sp>
+      <p:sp>
+        <p:nvSpPr>
+          <p:cNvPr id="39" name="Rectangle 38">
+            <a:extLst>
+              <a:ext uri="{FF2B5EF4-FFF2-40B4-BE49-F238E27FC236}">
+                <a16:creationId xmlns:a16="http://schemas.microsoft.com/office/drawing/2014/main" id="{596CF7E9-BB12-4227-9F5F-7E9747FAC361}"/>
+              </a:ext>
+            </a:extLst>
+          </p:cNvPr>
+          <p:cNvSpPr/>
+          <p:nvPr/>
+        </p:nvSpPr>
+        <p:spPr>
+          <a:xfrm rot="10800000" flipV="1">
+            <a:off x="1126731" y="2706691"/>
+            <a:ext cx="1123464" cy="707886"/>
+          </a:xfrm>
+          <a:prstGeom prst="rect">
+            <a:avLst/>
+          </a:prstGeom>
+        </p:spPr>
+        <p:txBody>
+          <a:bodyPr wrap="square">
+            <a:spAutoFit/>
+          </a:bodyPr>
+          <a:lstStyle/>
+          <a:p>
+            <a:pPr algn="ctr"/>
+            <a:r>
+              <a:rPr lang="en-US" sz="1000" dirty="0">
+                <a:latin typeface="+mj-lt"/>
+              </a:rPr>
+              <a:t>Test Executor will be the trigger point and Contain the tests</a:t>
+            </a:r>
+          </a:p>
+        </p:txBody>
+      </p:sp>
+      <p:sp>
+        <p:nvSpPr>
+          <p:cNvPr id="40" name="Rectangle 39">
+            <a:extLst>
+              <a:ext uri="{FF2B5EF4-FFF2-40B4-BE49-F238E27FC236}">
+                <a16:creationId xmlns:a16="http://schemas.microsoft.com/office/drawing/2014/main" id="{7D6B82AC-900E-4F6D-A4CC-9E515DC7FAD1}"/>
+              </a:ext>
+            </a:extLst>
+          </p:cNvPr>
+          <p:cNvSpPr/>
+          <p:nvPr/>
+        </p:nvSpPr>
+        <p:spPr>
+          <a:xfrm rot="10800000" flipV="1">
+            <a:off x="4041720" y="2231716"/>
+            <a:ext cx="2480879" cy="246221"/>
+          </a:xfrm>
+          <a:prstGeom prst="rect">
+            <a:avLst/>
+          </a:prstGeom>
+        </p:spPr>
+        <p:txBody>
+          <a:bodyPr wrap="square">
+            <a:spAutoFit/>
+          </a:bodyPr>
+          <a:lstStyle/>
+          <a:p>
+            <a:pPr algn="ctr"/>
+            <a:r>
+              <a:rPr lang="en-US" sz="1000" dirty="0">
+                <a:latin typeface="+mj-lt"/>
+              </a:rPr>
+              <a:t>Reads the functions/actions from the lib</a:t>
+            </a:r>
+          </a:p>
+        </p:txBody>
+      </p:sp>
+      <p:sp>
+        <p:nvSpPr>
+          <p:cNvPr id="9" name="Arrow: Down 8">
+            <a:extLst>
+              <a:ext uri="{FF2B5EF4-FFF2-40B4-BE49-F238E27FC236}">
+                <a16:creationId xmlns:a16="http://schemas.microsoft.com/office/drawing/2014/main" id="{4FB36A45-5410-444A-B582-386FCBEE5125}"/>
+              </a:ext>
+            </a:extLst>
+          </p:cNvPr>
+          <p:cNvSpPr/>
+          <p:nvPr/>
+        </p:nvSpPr>
+        <p:spPr>
+          <a:xfrm rot="18252875">
+            <a:off x="3341579" y="3538035"/>
+            <a:ext cx="162323" cy="1856510"/>
+          </a:xfrm>
+          <a:prstGeom prst="downArrow">
+            <a:avLst/>
+          </a:prstGeom>
+        </p:spPr>
+        <p:style>
+          <a:lnRef idx="2">
+            <a:schemeClr val="accent1">
+              <a:shade val="50000"/>
+            </a:schemeClr>
+          </a:lnRef>
+          <a:fillRef idx="1">
+            <a:schemeClr val="accent1"/>
+          </a:fillRef>
+          <a:effectRef idx="0">
+            <a:schemeClr val="accent1"/>
+          </a:effectRef>
+          <a:fontRef idx="minor">
+            <a:schemeClr val="lt1"/>
+          </a:fontRef>
+        </p:style>
+        <p:txBody>
+          <a:bodyPr rtlCol="0" anchor="ctr"/>
+          <a:lstStyle/>
+          <a:p>
+            <a:pPr algn="ctr"/>
+            <a:endParaRPr lang="en-US"/>
+          </a:p>
+        </p:txBody>
+      </p:sp>
+      <p:sp>
+        <p:nvSpPr>
+          <p:cNvPr id="41" name="Rectangle 40">
+            <a:extLst>
+              <a:ext uri="{FF2B5EF4-FFF2-40B4-BE49-F238E27FC236}">
+                <a16:creationId xmlns:a16="http://schemas.microsoft.com/office/drawing/2014/main" id="{9FED61F2-316B-426F-91B7-F558B7285530}"/>
+              </a:ext>
+            </a:extLst>
+          </p:cNvPr>
+          <p:cNvSpPr/>
+          <p:nvPr/>
+        </p:nvSpPr>
+        <p:spPr>
+          <a:xfrm rot="10800000" flipV="1">
+            <a:off x="3317940" y="4199642"/>
+            <a:ext cx="2480879" cy="400110"/>
+          </a:xfrm>
+          <a:prstGeom prst="rect">
+            <a:avLst/>
+          </a:prstGeom>
+        </p:spPr>
+        <p:txBody>
+          <a:bodyPr wrap="square">
+            <a:spAutoFit/>
+          </a:bodyPr>
+          <a:lstStyle/>
+          <a:p>
+            <a:pPr algn="ctr"/>
+            <a:r>
+              <a:rPr lang="en-US" sz="1000" dirty="0">
+                <a:latin typeface="+mj-lt"/>
+              </a:rPr>
+              <a:t>All object/elements will be stored and retrieved from here</a:t>
+            </a:r>
+          </a:p>
+        </p:txBody>
+      </p:sp>
+      <p:sp>
+        <p:nvSpPr>
+          <p:cNvPr id="43" name="Rectangle 42">
+            <a:extLst>
+              <a:ext uri="{FF2B5EF4-FFF2-40B4-BE49-F238E27FC236}">
+                <a16:creationId xmlns:a16="http://schemas.microsoft.com/office/drawing/2014/main" id="{5D00B20A-3992-4A59-8C59-E977A6994DB5}"/>
+              </a:ext>
+            </a:extLst>
+          </p:cNvPr>
+          <p:cNvSpPr/>
+          <p:nvPr/>
+        </p:nvSpPr>
+        <p:spPr>
+          <a:xfrm rot="10800000" flipV="1">
+            <a:off x="961021" y="4259279"/>
+            <a:ext cx="1406702" cy="553998"/>
+          </a:xfrm>
+          <a:prstGeom prst="rect">
+            <a:avLst/>
+          </a:prstGeom>
+        </p:spPr>
+        <p:txBody>
+          <a:bodyPr wrap="square">
+            <a:spAutoFit/>
+          </a:bodyPr>
+          <a:lstStyle/>
+          <a:p>
+            <a:pPr algn="ctr"/>
+            <a:r>
+              <a:rPr lang="en-US" sz="1000" dirty="0">
+                <a:latin typeface="+mj-lt"/>
+              </a:rPr>
+              <a:t>Perform an “action” with the “data” on the “object”</a:t>
+            </a:r>
+          </a:p>
+        </p:txBody>
+      </p:sp>
+      <p:sp>
+        <p:nvSpPr>
+          <p:cNvPr id="10" name="Cloud 9">
+            <a:extLst>
+              <a:ext uri="{FF2B5EF4-FFF2-40B4-BE49-F238E27FC236}">
+                <a16:creationId xmlns:a16="http://schemas.microsoft.com/office/drawing/2014/main" id="{2DEC77D4-3BE5-42E4-BF54-A353A341203C}"/>
+              </a:ext>
+            </a:extLst>
+          </p:cNvPr>
+          <p:cNvSpPr/>
+          <p:nvPr/>
+        </p:nvSpPr>
+        <p:spPr>
+          <a:xfrm>
+            <a:off x="2842985" y="5762754"/>
+            <a:ext cx="1532831" cy="580238"/>
+          </a:xfrm>
+          <a:prstGeom prst="cloud">
+            <a:avLst/>
+          </a:prstGeom>
+        </p:spPr>
+        <p:style>
+          <a:lnRef idx="2">
+            <a:schemeClr val="accent1">
+              <a:shade val="50000"/>
+            </a:schemeClr>
+          </a:lnRef>
+          <a:fillRef idx="1">
+            <a:schemeClr val="accent1"/>
+          </a:fillRef>
+          <a:effectRef idx="0">
+            <a:schemeClr val="accent1"/>
+          </a:effectRef>
+          <a:fontRef idx="minor">
+            <a:schemeClr val="lt1"/>
+          </a:fontRef>
+        </p:style>
+        <p:txBody>
+          <a:bodyPr rtlCol="0" anchor="ctr"/>
+          <a:lstStyle/>
+          <a:p>
+            <a:pPr algn="ctr"/>
+            <a:r>
+              <a:rPr lang="en-US" sz="1000" dirty="0"/>
+              <a:t>Application under Test</a:t>
+            </a:r>
+          </a:p>
+        </p:txBody>
+      </p:sp>
+      <p:sp>
+        <p:nvSpPr>
+          <p:cNvPr id="44" name="Arrow: Down 43">
+            <a:extLst>
+              <a:ext uri="{FF2B5EF4-FFF2-40B4-BE49-F238E27FC236}">
+                <a16:creationId xmlns:a16="http://schemas.microsoft.com/office/drawing/2014/main" id="{A678E277-EE37-4869-96AF-512649BE8D56}"/>
+              </a:ext>
+            </a:extLst>
+          </p:cNvPr>
+          <p:cNvSpPr/>
+          <p:nvPr/>
+        </p:nvSpPr>
+        <p:spPr>
+          <a:xfrm rot="18252875">
+            <a:off x="2856084" y="5502226"/>
+            <a:ext cx="150152" cy="465853"/>
+          </a:xfrm>
+          <a:prstGeom prst="downArrow">
+            <a:avLst/>
+          </a:prstGeom>
+        </p:spPr>
+        <p:style>
+          <a:lnRef idx="2">
+            <a:schemeClr val="accent1">
+              <a:shade val="50000"/>
+            </a:schemeClr>
+          </a:lnRef>
+          <a:fillRef idx="1">
+            <a:schemeClr val="accent1"/>
+          </a:fillRef>
+          <a:effectRef idx="0">
+            <a:schemeClr val="accent1"/>
+          </a:effectRef>
+          <a:fontRef idx="minor">
+            <a:schemeClr val="lt1"/>
+          </a:fontRef>
+        </p:style>
+        <p:txBody>
+          <a:bodyPr rtlCol="0" anchor="ctr"/>
+          <a:lstStyle/>
+          <a:p>
+            <a:pPr algn="ctr"/>
+            <a:endParaRPr lang="en-US"/>
+          </a:p>
+        </p:txBody>
+      </p:sp>
+      <p:sp>
+        <p:nvSpPr>
+          <p:cNvPr id="45" name="Arrow: Bent 44">
+            <a:extLst>
+              <a:ext uri="{FF2B5EF4-FFF2-40B4-BE49-F238E27FC236}">
+                <a16:creationId xmlns:a16="http://schemas.microsoft.com/office/drawing/2014/main" id="{F0016FEF-0C37-447E-9396-60741110E060}"/>
+              </a:ext>
+            </a:extLst>
+          </p:cNvPr>
+          <p:cNvSpPr/>
+          <p:nvPr/>
+        </p:nvSpPr>
+        <p:spPr>
+          <a:xfrm>
+            <a:off x="7239000" y="2231716"/>
+            <a:ext cx="270465" cy="1814615"/>
+          </a:xfrm>
+          <a:prstGeom prst="bentArrow">
+            <a:avLst/>
+          </a:prstGeom>
+        </p:spPr>
+        <p:style>
+          <a:lnRef idx="2">
+            <a:schemeClr val="accent1">
+              <a:shade val="50000"/>
+            </a:schemeClr>
+          </a:lnRef>
+          <a:fillRef idx="1">
+            <a:schemeClr val="accent1"/>
+          </a:fillRef>
+          <a:effectRef idx="0">
+            <a:schemeClr val="accent1"/>
+          </a:effectRef>
+          <a:fontRef idx="minor">
+            <a:schemeClr val="lt1"/>
+          </a:fontRef>
+        </p:style>
+        <p:txBody>
+          <a:bodyPr rtlCol="0" anchor="ctr"/>
+          <a:lstStyle/>
+          <a:p>
+            <a:pPr algn="ctr"/>
+            <a:endParaRPr lang="en-US">
+              <a:solidFill>
+                <a:schemeClr val="tx1"/>
+              </a:solidFill>
+            </a:endParaRPr>
+          </a:p>
+        </p:txBody>
+      </p:sp>
+      <p:sp>
+        <p:nvSpPr>
+          <p:cNvPr id="49" name="Rectangle 48">
+            <a:extLst>
+              <a:ext uri="{FF2B5EF4-FFF2-40B4-BE49-F238E27FC236}">
+                <a16:creationId xmlns:a16="http://schemas.microsoft.com/office/drawing/2014/main" id="{02DA0251-357D-41C4-8CE6-F9AEE676720F}"/>
+              </a:ext>
+            </a:extLst>
+          </p:cNvPr>
+          <p:cNvSpPr/>
+          <p:nvPr/>
+        </p:nvSpPr>
+        <p:spPr>
+          <a:xfrm rot="10800000" flipV="1">
+            <a:off x="7339266" y="2203683"/>
+            <a:ext cx="2480879" cy="246221"/>
+          </a:xfrm>
+          <a:prstGeom prst="rect">
+            <a:avLst/>
+          </a:prstGeom>
+        </p:spPr>
+        <p:txBody>
+          <a:bodyPr wrap="square">
+            <a:spAutoFit/>
+          </a:bodyPr>
+          <a:lstStyle/>
+          <a:p>
+            <a:pPr algn="ctr"/>
+            <a:r>
+              <a:rPr lang="en-US" sz="1000" dirty="0">
+                <a:latin typeface="+mj-lt"/>
+              </a:rPr>
+              <a:t>Test Scenarios will be listed down</a:t>
+            </a:r>
+          </a:p>
+        </p:txBody>
+      </p:sp>
+      <p:sp>
+        <p:nvSpPr>
+          <p:cNvPr id="50" name="Arrow: Bent 49">
+            <a:extLst>
+              <a:ext uri="{FF2B5EF4-FFF2-40B4-BE49-F238E27FC236}">
+                <a16:creationId xmlns:a16="http://schemas.microsoft.com/office/drawing/2014/main" id="{8086CE08-304E-49C8-8ACB-85A2B979DFE0}"/>
+              </a:ext>
+            </a:extLst>
+          </p:cNvPr>
+          <p:cNvSpPr/>
+          <p:nvPr/>
+        </p:nvSpPr>
+        <p:spPr>
+          <a:xfrm>
+            <a:off x="8331810" y="2732168"/>
+            <a:ext cx="270465" cy="1814615"/>
+          </a:xfrm>
+          <a:prstGeom prst="bentArrow">
+            <a:avLst/>
+          </a:prstGeom>
+        </p:spPr>
+        <p:style>
+          <a:lnRef idx="2">
+            <a:schemeClr val="accent1">
+              <a:shade val="50000"/>
+            </a:schemeClr>
+          </a:lnRef>
+          <a:fillRef idx="1">
+            <a:schemeClr val="accent1"/>
+          </a:fillRef>
+          <a:effectRef idx="0">
+            <a:schemeClr val="accent1"/>
+          </a:effectRef>
+          <a:fontRef idx="minor">
+            <a:schemeClr val="lt1"/>
+          </a:fontRef>
+        </p:style>
+        <p:txBody>
+          <a:bodyPr rtlCol="0" anchor="ctr"/>
+          <a:lstStyle/>
+          <a:p>
+            <a:pPr algn="ctr"/>
+            <a:endParaRPr lang="en-US">
+              <a:solidFill>
+                <a:schemeClr val="tx1"/>
+              </a:solidFill>
+            </a:endParaRPr>
+          </a:p>
+        </p:txBody>
+      </p:sp>
+      <p:sp>
+        <p:nvSpPr>
+          <p:cNvPr id="51" name="Rectangle 50">
+            <a:extLst>
+              <a:ext uri="{FF2B5EF4-FFF2-40B4-BE49-F238E27FC236}">
+                <a16:creationId xmlns:a16="http://schemas.microsoft.com/office/drawing/2014/main" id="{45719396-CCC8-4392-AC77-9B1BFDD0C434}"/>
+              </a:ext>
+            </a:extLst>
+          </p:cNvPr>
+          <p:cNvSpPr/>
+          <p:nvPr/>
+        </p:nvSpPr>
+        <p:spPr>
+          <a:xfrm rot="10800000" flipV="1">
+            <a:off x="8579705" y="2682385"/>
+            <a:ext cx="2480879" cy="246221"/>
+          </a:xfrm>
+          <a:prstGeom prst="rect">
+            <a:avLst/>
+          </a:prstGeom>
+        </p:spPr>
+        <p:txBody>
+          <a:bodyPr wrap="square">
+            <a:spAutoFit/>
+          </a:bodyPr>
+          <a:lstStyle/>
+          <a:p>
+            <a:pPr algn="ctr"/>
+            <a:r>
+              <a:rPr lang="en-US" sz="1000" dirty="0">
+                <a:latin typeface="+mj-lt"/>
+              </a:rPr>
+              <a:t>Flow of the test will be set with keywords</a:t>
+            </a:r>
+          </a:p>
+        </p:txBody>
+      </p:sp>
+      <p:sp>
+        <p:nvSpPr>
+          <p:cNvPr id="52" name="Arrow: Bent 51">
+            <a:extLst>
+              <a:ext uri="{FF2B5EF4-FFF2-40B4-BE49-F238E27FC236}">
+                <a16:creationId xmlns:a16="http://schemas.microsoft.com/office/drawing/2014/main" id="{3F034EDF-D7A5-4415-BEC5-04D66142C9DB}"/>
+              </a:ext>
+            </a:extLst>
+          </p:cNvPr>
+          <p:cNvSpPr/>
+          <p:nvPr/>
+        </p:nvSpPr>
+        <p:spPr>
+          <a:xfrm>
+            <a:off x="9321050" y="3328636"/>
+            <a:ext cx="270465" cy="1814615"/>
+          </a:xfrm>
+          <a:prstGeom prst="bentArrow">
+            <a:avLst/>
+          </a:prstGeom>
+        </p:spPr>
+        <p:style>
+          <a:lnRef idx="2">
+            <a:schemeClr val="accent1">
+              <a:shade val="50000"/>
+            </a:schemeClr>
+          </a:lnRef>
+          <a:fillRef idx="1">
+            <a:schemeClr val="accent1"/>
+          </a:fillRef>
+          <a:effectRef idx="0">
+            <a:schemeClr val="accent1"/>
+          </a:effectRef>
+          <a:fontRef idx="minor">
+            <a:schemeClr val="lt1"/>
+          </a:fontRef>
+        </p:style>
+        <p:txBody>
+          <a:bodyPr rtlCol="0" anchor="ctr"/>
+          <a:lstStyle/>
+          <a:p>
+            <a:pPr algn="ctr"/>
+            <a:endParaRPr lang="en-US">
+              <a:solidFill>
+                <a:schemeClr val="tx1"/>
+              </a:solidFill>
+            </a:endParaRPr>
+          </a:p>
+        </p:txBody>
+      </p:sp>
+      <p:sp>
+        <p:nvSpPr>
+          <p:cNvPr id="53" name="Rectangle 52">
+            <a:extLst>
+              <a:ext uri="{FF2B5EF4-FFF2-40B4-BE49-F238E27FC236}">
+                <a16:creationId xmlns:a16="http://schemas.microsoft.com/office/drawing/2014/main" id="{A9A3FC8C-DDD9-41B3-8EC4-D3E9ECBE8559}"/>
+              </a:ext>
+            </a:extLst>
+          </p:cNvPr>
+          <p:cNvSpPr/>
+          <p:nvPr/>
+        </p:nvSpPr>
+        <p:spPr>
+          <a:xfrm rot="10800000" flipV="1">
+            <a:off x="9495670" y="3266950"/>
+            <a:ext cx="2480879" cy="246221"/>
+          </a:xfrm>
+          <a:prstGeom prst="rect">
+            <a:avLst/>
+          </a:prstGeom>
+        </p:spPr>
+        <p:txBody>
+          <a:bodyPr wrap="square">
+            <a:spAutoFit/>
+          </a:bodyPr>
+          <a:lstStyle/>
+          <a:p>
+            <a:pPr algn="ctr"/>
+            <a:r>
+              <a:rPr lang="en-US" sz="1000" dirty="0">
+                <a:latin typeface="+mj-lt"/>
+              </a:rPr>
+              <a:t>Elements/Objects will be mentioned</a:t>
+            </a:r>
+          </a:p>
+        </p:txBody>
+      </p:sp>
+      <p:sp>
+        <p:nvSpPr>
+          <p:cNvPr id="54" name="Arrow: Bent 53">
+            <a:extLst>
+              <a:ext uri="{FF2B5EF4-FFF2-40B4-BE49-F238E27FC236}">
+                <a16:creationId xmlns:a16="http://schemas.microsoft.com/office/drawing/2014/main" id="{72433ADD-6645-4032-BDF8-DB200D180EC5}"/>
+              </a:ext>
+            </a:extLst>
+          </p:cNvPr>
+          <p:cNvSpPr/>
+          <p:nvPr/>
+        </p:nvSpPr>
+        <p:spPr>
+          <a:xfrm flipH="1">
+            <a:off x="11348615" y="3671857"/>
+            <a:ext cx="259901" cy="1814615"/>
+          </a:xfrm>
+          <a:prstGeom prst="bentArrow">
+            <a:avLst/>
+          </a:prstGeom>
+        </p:spPr>
+        <p:style>
+          <a:lnRef idx="2">
+            <a:schemeClr val="accent1">
+              <a:shade val="50000"/>
+            </a:schemeClr>
+          </a:lnRef>
+          <a:fillRef idx="1">
+            <a:schemeClr val="accent1"/>
+          </a:fillRef>
+          <a:effectRef idx="0">
+            <a:schemeClr val="accent1"/>
+          </a:effectRef>
+          <a:fontRef idx="minor">
+            <a:schemeClr val="lt1"/>
+          </a:fontRef>
+        </p:style>
+        <p:txBody>
+          <a:bodyPr rtlCol="0" anchor="ctr"/>
+          <a:lstStyle/>
+          <a:p>
+            <a:pPr algn="ctr"/>
+            <a:endParaRPr lang="en-US">
+              <a:solidFill>
+                <a:schemeClr val="tx1"/>
+              </a:solidFill>
+            </a:endParaRPr>
+          </a:p>
+        </p:txBody>
+      </p:sp>
+      <p:sp>
+        <p:nvSpPr>
+          <p:cNvPr id="55" name="Rectangle 54">
+            <a:extLst>
+              <a:ext uri="{FF2B5EF4-FFF2-40B4-BE49-F238E27FC236}">
+                <a16:creationId xmlns:a16="http://schemas.microsoft.com/office/drawing/2014/main" id="{06071FF8-3F51-4516-8B96-6B7301E7BC6F}"/>
+              </a:ext>
+            </a:extLst>
+          </p:cNvPr>
+          <p:cNvSpPr/>
+          <p:nvPr/>
+        </p:nvSpPr>
+        <p:spPr>
+          <a:xfrm rot="10800000" flipV="1">
+            <a:off x="9118935" y="3605293"/>
+            <a:ext cx="2480879" cy="246221"/>
+          </a:xfrm>
+          <a:prstGeom prst="rect">
+            <a:avLst/>
+          </a:prstGeom>
+        </p:spPr>
+        <p:txBody>
+          <a:bodyPr wrap="square">
+            <a:spAutoFit/>
+          </a:bodyPr>
+          <a:lstStyle/>
+          <a:p>
+            <a:pPr algn="ctr"/>
+            <a:r>
+              <a:rPr lang="en-US" sz="1000" dirty="0">
+                <a:latin typeface="+mj-lt"/>
+              </a:rPr>
+              <a:t>Values to supply, if any</a:t>
+            </a:r>
+          </a:p>
+        </p:txBody>
+      </p:sp>
+      <p:pic>
+        <p:nvPicPr>
+          <p:cNvPr id="13" name="Picture 12">
+            <a:extLst>
+              <a:ext uri="{FF2B5EF4-FFF2-40B4-BE49-F238E27FC236}">
+                <a16:creationId xmlns:a16="http://schemas.microsoft.com/office/drawing/2014/main" id="{2F860605-0122-4924-A990-4AD00094AE90}"/>
+              </a:ext>
+            </a:extLst>
+          </p:cNvPr>
+          <p:cNvPicPr>
+            <a:picLocks noChangeAspect="1"/>
+          </p:cNvPicPr>
+          <p:nvPr/>
+        </p:nvPicPr>
+        <p:blipFill>
+          <a:blip r:embed="rId2"/>
+          <a:stretch>
+            <a:fillRect/>
+          </a:stretch>
+        </p:blipFill>
+        <p:spPr>
+          <a:xfrm>
+            <a:off x="6860514" y="3933656"/>
+            <a:ext cx="5270313" cy="2187152"/>
+          </a:xfrm>
+          <a:prstGeom prst="rect">
+            <a:avLst/>
+          </a:prstGeom>
+        </p:spPr>
+      </p:pic>
+      <p:sp>
+        <p:nvSpPr>
+          <p:cNvPr id="56" name="Rectangle 55">
+            <a:extLst>
+              <a:ext uri="{FF2B5EF4-FFF2-40B4-BE49-F238E27FC236}">
+                <a16:creationId xmlns:a16="http://schemas.microsoft.com/office/drawing/2014/main" id="{8E7936EA-CBF8-40A6-8B32-78EC9A7DC278}"/>
+              </a:ext>
+            </a:extLst>
+          </p:cNvPr>
+          <p:cNvSpPr/>
+          <p:nvPr/>
+        </p:nvSpPr>
+        <p:spPr>
+          <a:xfrm rot="10800000" flipV="1">
+            <a:off x="7749112" y="6136386"/>
+            <a:ext cx="5031866" cy="246221"/>
+          </a:xfrm>
+          <a:prstGeom prst="rect">
+            <a:avLst/>
+          </a:prstGeom>
+        </p:spPr>
+        <p:txBody>
+          <a:bodyPr wrap="square">
+            <a:spAutoFit/>
+          </a:bodyPr>
+          <a:lstStyle/>
+          <a:p>
+            <a:pPr algn="ctr"/>
+            <a:r>
+              <a:rPr lang="en-US" sz="1000" i="1" dirty="0">
+                <a:latin typeface="+mj-lt"/>
+              </a:rPr>
+              <a:t>How a test case might look like.</a:t>
+            </a:r>
+          </a:p>
+        </p:txBody>
+      </p:sp>
+    </p:spTree>
+    <p:extLst>
+      <p:ext uri="{BB962C8B-B14F-4D97-AF65-F5344CB8AC3E}">
+        <p14:creationId xmlns:p14="http://schemas.microsoft.com/office/powerpoint/2010/main" val="3854402827"/>
+      </p:ext>
+    </p:extLst>
+  </p:cSld>
+  <p:clrMapOvr>
+    <a:masterClrMapping/>
+  </p:clrMapOvr>
+</p:sld>
+</file>
+
+<file path=ppt/slides/slide6.xml><?xml version="1.0" encoding="utf-8"?>
+<p:sld xmlns:a="http://schemas.openxmlformats.org/drawingml/2006/main" xmlns:r="http://schemas.openxmlformats.org/officeDocument/2006/relationships" xmlns:p="http://schemas.openxmlformats.org/presentationml/2006/main">
+  <p:cSld>
+    <p:spTree>
+      <p:nvGrpSpPr>
+        <p:cNvPr id="1" name=""/>
+        <p:cNvGrpSpPr/>
+        <p:nvPr/>
+      </p:nvGrpSpPr>
+      <p:grpSpPr>
+        <a:xfrm>
+          <a:off x="0" y="0"/>
+          <a:ext cx="0" cy="0"/>
+          <a:chOff x="0" y="0"/>
+          <a:chExt cx="0" cy="0"/>
+        </a:xfrm>
+      </p:grpSpPr>
+      <p:sp>
+        <p:nvSpPr>
+          <p:cNvPr id="37" name="Cloud 36">
+            <a:extLst>
+              <a:ext uri="{FF2B5EF4-FFF2-40B4-BE49-F238E27FC236}">
+                <a16:creationId xmlns:a16="http://schemas.microsoft.com/office/drawing/2014/main" id="{622AEDD0-8CD4-4089-887C-05662C6A32B4}"/>
+              </a:ext>
+            </a:extLst>
+          </p:cNvPr>
+          <p:cNvSpPr/>
+          <p:nvPr/>
+        </p:nvSpPr>
+        <p:spPr>
+          <a:xfrm>
+            <a:off x="2570800" y="5236643"/>
+            <a:ext cx="1532831" cy="580238"/>
+          </a:xfrm>
+          <a:prstGeom prst="cloud">
+            <a:avLst/>
+          </a:prstGeom>
+        </p:spPr>
+        <p:style>
+          <a:lnRef idx="2">
+            <a:schemeClr val="accent1">
+              <a:shade val="50000"/>
+            </a:schemeClr>
+          </a:lnRef>
+          <a:fillRef idx="1">
+            <a:schemeClr val="accent1"/>
+          </a:fillRef>
+          <a:effectRef idx="0">
+            <a:schemeClr val="accent1"/>
+          </a:effectRef>
+          <a:fontRef idx="minor">
+            <a:schemeClr val="lt1"/>
+          </a:fontRef>
+        </p:style>
+        <p:txBody>
+          <a:bodyPr rtlCol="0" anchor="ctr"/>
+          <a:lstStyle/>
+          <a:p>
+            <a:pPr algn="ctr"/>
+            <a:r>
+              <a:rPr lang="en-US" sz="1000" dirty="0"/>
+              <a:t>Application under Test</a:t>
+            </a:r>
+          </a:p>
+        </p:txBody>
+      </p:sp>
+      <p:sp>
+        <p:nvSpPr>
+          <p:cNvPr id="2" name="Title 1">
+            <a:extLst>
+              <a:ext uri="{FF2B5EF4-FFF2-40B4-BE49-F238E27FC236}">
+                <a16:creationId xmlns:a16="http://schemas.microsoft.com/office/drawing/2014/main" id="{0D157F11-29CC-473A-B5A3-CC53D182D2B8}"/>
+              </a:ext>
+            </a:extLst>
+          </p:cNvPr>
+          <p:cNvSpPr>
+            <a:spLocks noGrp="1"/>
+          </p:cNvSpPr>
+          <p:nvPr>
+            <p:ph type="title"/>
+          </p:nvPr>
+        </p:nvSpPr>
+        <p:spPr/>
+        <p:txBody>
+          <a:bodyPr/>
+          <a:lstStyle/>
+          <a:p>
+            <a:r>
+              <a:rPr lang="en-AU" dirty="0"/>
+              <a:t>Data driven framework</a:t>
+            </a:r>
+          </a:p>
+        </p:txBody>
+      </p:sp>
+      <p:sp>
+        <p:nvSpPr>
+          <p:cNvPr id="5" name="Rectangle 4">
+            <a:extLst>
+              <a:ext uri="{FF2B5EF4-FFF2-40B4-BE49-F238E27FC236}">
+                <a16:creationId xmlns:a16="http://schemas.microsoft.com/office/drawing/2014/main" id="{4B23FCDD-F7F1-409E-B431-7434532A0F9A}"/>
+              </a:ext>
+            </a:extLst>
+          </p:cNvPr>
+          <p:cNvSpPr/>
+          <p:nvPr/>
+        </p:nvSpPr>
+        <p:spPr>
+          <a:xfrm>
+            <a:off x="2785383" y="1478005"/>
+            <a:ext cx="6886517" cy="646331"/>
+          </a:xfrm>
+          <a:prstGeom prst="rect">
+            <a:avLst/>
+          </a:prstGeom>
+        </p:spPr>
+        <p:txBody>
+          <a:bodyPr wrap="square">
+            <a:spAutoFit/>
+          </a:bodyPr>
+          <a:lstStyle/>
+          <a:p>
+            <a:pPr algn="ctr"/>
+            <a:r>
+              <a:rPr lang="en-US" dirty="0"/>
+              <a:t>Framework consists of code internally with test input and output values read from data files (Excel, CSV, ODBC sources)</a:t>
+            </a:r>
+            <a:endParaRPr lang="en-AU" sz="1400" dirty="0">
+              <a:solidFill>
+                <a:schemeClr val="bg1">
+                  <a:lumMod val="50000"/>
+                </a:schemeClr>
+              </a:solidFill>
+              <a:ea typeface="Open Sans" panose="020B0606030504020204" pitchFamily="34" charset="0"/>
+              <a:cs typeface="Open Sans" panose="020B0606030504020204" pitchFamily="34" charset="0"/>
+            </a:endParaRPr>
+          </a:p>
+        </p:txBody>
+      </p:sp>
+      <p:sp>
+        <p:nvSpPr>
+          <p:cNvPr id="6" name="Rectangle: Rounded Corners 5">
+            <a:extLst>
+              <a:ext uri="{FF2B5EF4-FFF2-40B4-BE49-F238E27FC236}">
+                <a16:creationId xmlns:a16="http://schemas.microsoft.com/office/drawing/2014/main" id="{2A4F034D-D4A7-49F4-8A91-0A69EB4C2BC3}"/>
+              </a:ext>
+            </a:extLst>
+          </p:cNvPr>
+          <p:cNvSpPr/>
+          <p:nvPr/>
+        </p:nvSpPr>
+        <p:spPr>
+          <a:xfrm>
+            <a:off x="491067" y="2904067"/>
+            <a:ext cx="1286933" cy="1371600"/>
+          </a:xfrm>
+          <a:prstGeom prst="roundRect">
+            <a:avLst/>
+          </a:prstGeom>
+        </p:spPr>
+        <p:style>
+          <a:lnRef idx="2">
+            <a:schemeClr val="accent1">
+              <a:shade val="50000"/>
+            </a:schemeClr>
+          </a:lnRef>
+          <a:fillRef idx="1">
+            <a:schemeClr val="accent1"/>
+          </a:fillRef>
+          <a:effectRef idx="0">
+            <a:schemeClr val="accent1"/>
+          </a:effectRef>
+          <a:fontRef idx="minor">
+            <a:schemeClr val="lt1"/>
+          </a:fontRef>
+        </p:style>
+        <p:txBody>
+          <a:bodyPr rtlCol="0" anchor="ctr"/>
+          <a:lstStyle/>
+          <a:p>
+            <a:pPr algn="ctr"/>
+            <a:endParaRPr lang="en-US"/>
+          </a:p>
+        </p:txBody>
+      </p:sp>
+      <p:sp>
+        <p:nvSpPr>
+          <p:cNvPr id="26" name="Rectangle: Rounded Corners 25">
+            <a:extLst>
+              <a:ext uri="{FF2B5EF4-FFF2-40B4-BE49-F238E27FC236}">
+                <a16:creationId xmlns:a16="http://schemas.microsoft.com/office/drawing/2014/main" id="{C57E27E0-296B-4B73-A367-F94BFF1FAD4B}"/>
+              </a:ext>
+            </a:extLst>
+          </p:cNvPr>
+          <p:cNvSpPr/>
+          <p:nvPr/>
+        </p:nvSpPr>
+        <p:spPr>
+          <a:xfrm>
+            <a:off x="643467" y="3056467"/>
+            <a:ext cx="1286933" cy="1371600"/>
+          </a:xfrm>
+          <a:prstGeom prst="roundRect">
+            <a:avLst/>
+          </a:prstGeom>
+        </p:spPr>
+        <p:style>
+          <a:lnRef idx="2">
+            <a:schemeClr val="accent1">
+              <a:shade val="50000"/>
+            </a:schemeClr>
+          </a:lnRef>
+          <a:fillRef idx="1">
+            <a:schemeClr val="accent1"/>
+          </a:fillRef>
+          <a:effectRef idx="0">
+            <a:schemeClr val="accent1"/>
+          </a:effectRef>
+          <a:fontRef idx="minor">
+            <a:schemeClr val="lt1"/>
+          </a:fontRef>
+        </p:style>
+        <p:txBody>
+          <a:bodyPr rtlCol="0" anchor="ctr"/>
+          <a:lstStyle/>
+          <a:p>
+            <a:pPr algn="ctr"/>
+            <a:r>
+              <a:rPr lang="en-US" sz="1400" dirty="0"/>
+              <a:t>Test Data</a:t>
+            </a:r>
+          </a:p>
+        </p:txBody>
+      </p:sp>
+      <p:sp>
+        <p:nvSpPr>
+          <p:cNvPr id="32" name="Rectangle: Rounded Corners 31">
+            <a:extLst>
+              <a:ext uri="{FF2B5EF4-FFF2-40B4-BE49-F238E27FC236}">
+                <a16:creationId xmlns:a16="http://schemas.microsoft.com/office/drawing/2014/main" id="{0EAEE8C6-4F03-4652-ADC7-B57847955A31}"/>
+              </a:ext>
+            </a:extLst>
+          </p:cNvPr>
+          <p:cNvSpPr/>
+          <p:nvPr/>
+        </p:nvSpPr>
+        <p:spPr>
+          <a:xfrm>
+            <a:off x="3539598" y="2904067"/>
+            <a:ext cx="1286933" cy="1371600"/>
+          </a:xfrm>
+          <a:prstGeom prst="roundRect">
+            <a:avLst/>
+          </a:prstGeom>
+        </p:spPr>
+        <p:style>
+          <a:lnRef idx="2">
+            <a:schemeClr val="accent1">
+              <a:shade val="50000"/>
+            </a:schemeClr>
+          </a:lnRef>
+          <a:fillRef idx="1">
+            <a:schemeClr val="accent1"/>
+          </a:fillRef>
+          <a:effectRef idx="0">
+            <a:schemeClr val="accent1"/>
+          </a:effectRef>
+          <a:fontRef idx="minor">
+            <a:schemeClr val="lt1"/>
+          </a:fontRef>
+        </p:style>
+        <p:txBody>
+          <a:bodyPr rtlCol="0" anchor="ctr"/>
+          <a:lstStyle/>
+          <a:p>
+            <a:pPr algn="ctr"/>
+            <a:endParaRPr lang="en-US"/>
+          </a:p>
+        </p:txBody>
+      </p:sp>
+      <p:sp>
+        <p:nvSpPr>
+          <p:cNvPr id="7" name="Arrow: Left-Right 6">
+            <a:extLst>
+              <a:ext uri="{FF2B5EF4-FFF2-40B4-BE49-F238E27FC236}">
+                <a16:creationId xmlns:a16="http://schemas.microsoft.com/office/drawing/2014/main" id="{F575493F-EC12-4F11-81C0-A643DAEB4CE8}"/>
+              </a:ext>
+            </a:extLst>
+          </p:cNvPr>
+          <p:cNvSpPr/>
+          <p:nvPr/>
+        </p:nvSpPr>
+        <p:spPr>
+          <a:xfrm>
+            <a:off x="2074333" y="3575978"/>
+            <a:ext cx="1312865" cy="335622"/>
+          </a:xfrm>
+          <a:prstGeom prst="leftRightArrow">
+            <a:avLst/>
+          </a:prstGeom>
+        </p:spPr>
+        <p:style>
+          <a:lnRef idx="2">
+            <a:schemeClr val="accent1">
+              <a:shade val="50000"/>
+            </a:schemeClr>
+          </a:lnRef>
+          <a:fillRef idx="1">
+            <a:schemeClr val="accent1"/>
+          </a:fillRef>
+          <a:effectRef idx="0">
+            <a:schemeClr val="accent1"/>
+          </a:effectRef>
+          <a:fontRef idx="minor">
+            <a:schemeClr val="lt1"/>
+          </a:fontRef>
+        </p:style>
+        <p:txBody>
+          <a:bodyPr rtlCol="0" anchor="ctr"/>
+          <a:lstStyle/>
+          <a:p>
+            <a:pPr algn="ctr"/>
+            <a:endParaRPr lang="en-US"/>
+          </a:p>
+        </p:txBody>
+      </p:sp>
+      <p:sp>
+        <p:nvSpPr>
+          <p:cNvPr id="34" name="Rectangle 33">
+            <a:extLst>
+              <a:ext uri="{FF2B5EF4-FFF2-40B4-BE49-F238E27FC236}">
+                <a16:creationId xmlns:a16="http://schemas.microsoft.com/office/drawing/2014/main" id="{7A475192-7A92-4083-822C-C42A339D4D15}"/>
+              </a:ext>
+            </a:extLst>
+          </p:cNvPr>
+          <p:cNvSpPr/>
+          <p:nvPr/>
+        </p:nvSpPr>
+        <p:spPr>
+          <a:xfrm rot="10800000" flipV="1">
+            <a:off x="2139400" y="3908214"/>
+            <a:ext cx="1123464" cy="861774"/>
+          </a:xfrm>
+          <a:prstGeom prst="rect">
+            <a:avLst/>
+          </a:prstGeom>
+        </p:spPr>
+        <p:txBody>
+          <a:bodyPr wrap="square">
+            <a:spAutoFit/>
+          </a:bodyPr>
+          <a:lstStyle/>
+          <a:p>
+            <a:pPr algn="ctr"/>
+            <a:r>
+              <a:rPr lang="en-US" sz="1000" dirty="0">
+                <a:latin typeface="+mj-lt"/>
+              </a:rPr>
+              <a:t>External frameworks like Apache POI to fetch data for tests</a:t>
+            </a:r>
+          </a:p>
+        </p:txBody>
+      </p:sp>
+      <p:sp>
+        <p:nvSpPr>
+          <p:cNvPr id="36" name="Arrow: Down 35">
+            <a:extLst>
+              <a:ext uri="{FF2B5EF4-FFF2-40B4-BE49-F238E27FC236}">
+                <a16:creationId xmlns:a16="http://schemas.microsoft.com/office/drawing/2014/main" id="{F7750820-8D6E-4840-8573-80AD6BE87751}"/>
+              </a:ext>
+            </a:extLst>
+          </p:cNvPr>
+          <p:cNvSpPr/>
+          <p:nvPr/>
+        </p:nvSpPr>
+        <p:spPr>
+          <a:xfrm rot="1185414">
+            <a:off x="3839634" y="4370687"/>
+            <a:ext cx="93205" cy="1023599"/>
+          </a:xfrm>
+          <a:prstGeom prst="downArrow">
+            <a:avLst/>
+          </a:prstGeom>
+        </p:spPr>
+        <p:style>
+          <a:lnRef idx="2">
+            <a:schemeClr val="accent1">
+              <a:shade val="50000"/>
+            </a:schemeClr>
+          </a:lnRef>
+          <a:fillRef idx="1">
+            <a:schemeClr val="accent1"/>
+          </a:fillRef>
+          <a:effectRef idx="0">
+            <a:schemeClr val="accent1"/>
+          </a:effectRef>
+          <a:fontRef idx="minor">
+            <a:schemeClr val="lt1"/>
+          </a:fontRef>
+        </p:style>
+        <p:txBody>
+          <a:bodyPr rtlCol="0" anchor="ctr"/>
+          <a:lstStyle/>
+          <a:p>
+            <a:pPr algn="ctr"/>
+            <a:endParaRPr lang="en-US"/>
+          </a:p>
+        </p:txBody>
+      </p:sp>
+      <p:sp>
+        <p:nvSpPr>
+          <p:cNvPr id="35" name="Cloud 34">
+            <a:extLst>
+              <a:ext uri="{FF2B5EF4-FFF2-40B4-BE49-F238E27FC236}">
+                <a16:creationId xmlns:a16="http://schemas.microsoft.com/office/drawing/2014/main" id="{D2CD2D85-597C-4C1F-9377-B1DC74CC40C3}"/>
+              </a:ext>
+            </a:extLst>
+          </p:cNvPr>
+          <p:cNvSpPr/>
+          <p:nvPr/>
+        </p:nvSpPr>
+        <p:spPr>
+          <a:xfrm>
+            <a:off x="2373179" y="5346036"/>
+            <a:ext cx="1532831" cy="580238"/>
+          </a:xfrm>
+          <a:prstGeom prst="cloud">
+            <a:avLst/>
+          </a:prstGeom>
+        </p:spPr>
+        <p:style>
+          <a:lnRef idx="2">
+            <a:schemeClr val="accent1">
+              <a:shade val="50000"/>
+            </a:schemeClr>
+          </a:lnRef>
+          <a:fillRef idx="1">
+            <a:schemeClr val="accent1"/>
+          </a:fillRef>
+          <a:effectRef idx="0">
+            <a:schemeClr val="accent1"/>
+          </a:effectRef>
+          <a:fontRef idx="minor">
+            <a:schemeClr val="lt1"/>
+          </a:fontRef>
+        </p:style>
+        <p:txBody>
+          <a:bodyPr rtlCol="0" anchor="ctr"/>
+          <a:lstStyle/>
+          <a:p>
+            <a:pPr algn="ctr"/>
+            <a:r>
+              <a:rPr lang="en-US" sz="1000" dirty="0"/>
+              <a:t>Application under Test</a:t>
+            </a:r>
+          </a:p>
+        </p:txBody>
+      </p:sp>
+      <p:sp>
+        <p:nvSpPr>
+          <p:cNvPr id="33" name="Rectangle: Rounded Corners 32">
+            <a:extLst>
+              <a:ext uri="{FF2B5EF4-FFF2-40B4-BE49-F238E27FC236}">
+                <a16:creationId xmlns:a16="http://schemas.microsoft.com/office/drawing/2014/main" id="{6A23F6CB-C8AE-44DD-9367-7BC4BABA6CE6}"/>
+              </a:ext>
+            </a:extLst>
+          </p:cNvPr>
+          <p:cNvSpPr/>
+          <p:nvPr/>
+        </p:nvSpPr>
+        <p:spPr>
+          <a:xfrm>
+            <a:off x="3691998" y="3056467"/>
+            <a:ext cx="1286933" cy="1371600"/>
+          </a:xfrm>
+          <a:prstGeom prst="roundRect">
+            <a:avLst/>
+          </a:prstGeom>
+        </p:spPr>
+        <p:style>
+          <a:lnRef idx="2">
+            <a:schemeClr val="accent1">
+              <a:shade val="50000"/>
+            </a:schemeClr>
+          </a:lnRef>
+          <a:fillRef idx="1">
+            <a:schemeClr val="accent1"/>
+          </a:fillRef>
+          <a:effectRef idx="0">
+            <a:schemeClr val="accent1"/>
+          </a:effectRef>
+          <a:fontRef idx="minor">
+            <a:schemeClr val="lt1"/>
+          </a:fontRef>
+        </p:style>
+        <p:txBody>
+          <a:bodyPr rtlCol="0" anchor="ctr"/>
+          <a:lstStyle/>
+          <a:p>
+            <a:pPr algn="ctr"/>
+            <a:r>
+              <a:rPr lang="en-US" sz="1400" dirty="0"/>
+              <a:t>Test Scripts/Code</a:t>
+            </a:r>
+          </a:p>
+        </p:txBody>
+      </p:sp>
+      <p:pic>
+        <p:nvPicPr>
+          <p:cNvPr id="8" name="Picture 7">
+            <a:extLst>
+              <a:ext uri="{FF2B5EF4-FFF2-40B4-BE49-F238E27FC236}">
+                <a16:creationId xmlns:a16="http://schemas.microsoft.com/office/drawing/2014/main" id="{06247B69-C56E-405D-8130-193D80475478}"/>
+              </a:ext>
+            </a:extLst>
+          </p:cNvPr>
+          <p:cNvPicPr>
+            <a:picLocks noChangeAspect="1"/>
+          </p:cNvPicPr>
+          <p:nvPr/>
+        </p:nvPicPr>
+        <p:blipFill>
+          <a:blip r:embed="rId2"/>
+          <a:stretch>
+            <a:fillRect/>
+          </a:stretch>
+        </p:blipFill>
+        <p:spPr>
+          <a:xfrm>
+            <a:off x="4780301" y="4946524"/>
+            <a:ext cx="7362826" cy="580238"/>
+          </a:xfrm>
+          <a:prstGeom prst="rect">
+            <a:avLst/>
+          </a:prstGeom>
+        </p:spPr>
+      </p:pic>
+      <p:sp>
+        <p:nvSpPr>
+          <p:cNvPr id="38" name="Rectangle 37">
+            <a:extLst>
+              <a:ext uri="{FF2B5EF4-FFF2-40B4-BE49-F238E27FC236}">
+                <a16:creationId xmlns:a16="http://schemas.microsoft.com/office/drawing/2014/main" id="{B9840C6C-9004-4BE7-A682-1BB408E99B4C}"/>
+              </a:ext>
+            </a:extLst>
+          </p:cNvPr>
+          <p:cNvSpPr/>
+          <p:nvPr/>
+        </p:nvSpPr>
+        <p:spPr>
+          <a:xfrm rot="10800000" flipV="1">
+            <a:off x="6025600" y="2972603"/>
+            <a:ext cx="5031866" cy="307777"/>
+          </a:xfrm>
+          <a:prstGeom prst="rect">
+            <a:avLst/>
+          </a:prstGeom>
+        </p:spPr>
+        <p:txBody>
+          <a:bodyPr wrap="square">
+            <a:spAutoFit/>
+          </a:bodyPr>
+          <a:lstStyle/>
+          <a:p>
+            <a:r>
+              <a:rPr lang="en-US" sz="1400" dirty="0">
+                <a:latin typeface="+mj-lt"/>
+              </a:rPr>
+              <a:t>Test scripts will be created with the code.</a:t>
+            </a:r>
+          </a:p>
+        </p:txBody>
+      </p:sp>
+      <p:sp>
+        <p:nvSpPr>
+          <p:cNvPr id="39" name="Rectangle 38">
+            <a:extLst>
+              <a:ext uri="{FF2B5EF4-FFF2-40B4-BE49-F238E27FC236}">
+                <a16:creationId xmlns:a16="http://schemas.microsoft.com/office/drawing/2014/main" id="{19EB5825-21A5-42B8-8CC9-BA1C81C792DB}"/>
+              </a:ext>
+            </a:extLst>
+          </p:cNvPr>
+          <p:cNvSpPr/>
+          <p:nvPr/>
+        </p:nvSpPr>
+        <p:spPr>
+          <a:xfrm rot="10800000" flipV="1">
+            <a:off x="6228641" y="3491061"/>
+            <a:ext cx="5031866" cy="307777"/>
+          </a:xfrm>
+          <a:prstGeom prst="rect">
+            <a:avLst/>
+          </a:prstGeom>
+        </p:spPr>
+        <p:txBody>
+          <a:bodyPr wrap="square">
+            <a:spAutoFit/>
+          </a:bodyPr>
+          <a:lstStyle/>
+          <a:p>
+            <a:pPr algn="ctr"/>
+            <a:r>
+              <a:rPr lang="en-US" sz="1400" dirty="0">
+                <a:latin typeface="+mj-lt"/>
+              </a:rPr>
+              <a:t>Data for the execution will be fetched from external sources</a:t>
+            </a:r>
+          </a:p>
+        </p:txBody>
+      </p:sp>
+      <p:sp>
+        <p:nvSpPr>
+          <p:cNvPr id="40" name="Rectangle 39">
+            <a:extLst>
+              <a:ext uri="{FF2B5EF4-FFF2-40B4-BE49-F238E27FC236}">
+                <a16:creationId xmlns:a16="http://schemas.microsoft.com/office/drawing/2014/main" id="{80B08281-FF79-4FB0-AE3C-4BD0852E5F9C}"/>
+              </a:ext>
+            </a:extLst>
+          </p:cNvPr>
+          <p:cNvSpPr/>
+          <p:nvPr/>
+        </p:nvSpPr>
+        <p:spPr>
+          <a:xfrm rot="10800000" flipV="1">
+            <a:off x="6669067" y="4084823"/>
+            <a:ext cx="5031866" cy="307777"/>
+          </a:xfrm>
+          <a:prstGeom prst="rect">
+            <a:avLst/>
+          </a:prstGeom>
+        </p:spPr>
+        <p:txBody>
+          <a:bodyPr wrap="square">
+            <a:spAutoFit/>
+          </a:bodyPr>
+          <a:lstStyle/>
+          <a:p>
+            <a:pPr algn="ctr"/>
+            <a:r>
+              <a:rPr lang="en-US" sz="1400" dirty="0">
+                <a:latin typeface="+mj-lt"/>
+              </a:rPr>
+              <a:t>Results will be updated back into the external sources.</a:t>
+            </a:r>
+          </a:p>
+        </p:txBody>
+      </p:sp>
+      <p:sp>
+        <p:nvSpPr>
+          <p:cNvPr id="41" name="Rectangle 40">
+            <a:extLst>
+              <a:ext uri="{FF2B5EF4-FFF2-40B4-BE49-F238E27FC236}">
+                <a16:creationId xmlns:a16="http://schemas.microsoft.com/office/drawing/2014/main" id="{DB27BAC7-882A-4A8E-9F76-4842B5E09F6B}"/>
+              </a:ext>
+            </a:extLst>
+          </p:cNvPr>
+          <p:cNvSpPr/>
+          <p:nvPr/>
+        </p:nvSpPr>
+        <p:spPr>
+          <a:xfrm rot="10800000" flipV="1">
+            <a:off x="7723712" y="5570660"/>
+            <a:ext cx="5031866" cy="246221"/>
+          </a:xfrm>
+          <a:prstGeom prst="rect">
+            <a:avLst/>
+          </a:prstGeom>
+        </p:spPr>
+        <p:txBody>
+          <a:bodyPr wrap="square">
+            <a:spAutoFit/>
+          </a:bodyPr>
+          <a:lstStyle/>
+          <a:p>
+            <a:pPr algn="ctr"/>
+            <a:r>
+              <a:rPr lang="en-US" sz="1000" i="1" dirty="0">
+                <a:latin typeface="+mj-lt"/>
+              </a:rPr>
+              <a:t>How a test data might look like.</a:t>
+            </a:r>
+          </a:p>
+        </p:txBody>
+      </p:sp>
+    </p:spTree>
+    <p:extLst>
+      <p:ext uri="{BB962C8B-B14F-4D97-AF65-F5344CB8AC3E}">
+        <p14:creationId xmlns:p14="http://schemas.microsoft.com/office/powerpoint/2010/main" val="1032875544"/>
+      </p:ext>
+    </p:extLst>
+  </p:cSld>
+  <p:clrMapOvr>
+    <a:masterClrMapping/>
+  </p:clrMapOvr>
+</p:sld>
+</file>
+
+<file path=ppt/slides/slide7.xml><?xml version="1.0" encoding="utf-8"?>
+<p:sld xmlns:a="http://schemas.openxmlformats.org/drawingml/2006/main" xmlns:r="http://schemas.openxmlformats.org/officeDocument/2006/relationships" xmlns:p="http://schemas.openxmlformats.org/presentationml/2006/main">
+  <p:cSld>
+    <p:spTree>
+      <p:nvGrpSpPr>
+        <p:cNvPr id="1" name=""/>
+        <p:cNvGrpSpPr/>
+        <p:nvPr/>
+      </p:nvGrpSpPr>
+      <p:grpSpPr>
+        <a:xfrm>
+          <a:off x="0" y="0"/>
+          <a:ext cx="0" cy="0"/>
+          <a:chOff x="0" y="0"/>
+          <a:chExt cx="0" cy="0"/>
+        </a:xfrm>
+      </p:grpSpPr>
+      <p:sp>
+        <p:nvSpPr>
+          <p:cNvPr id="43" name="Arrow: Down 42">
+            <a:extLst>
+              <a:ext uri="{FF2B5EF4-FFF2-40B4-BE49-F238E27FC236}">
+                <a16:creationId xmlns:a16="http://schemas.microsoft.com/office/drawing/2014/main" id="{58535C38-48FA-42A9-911B-14CEE3474286}"/>
+              </a:ext>
+            </a:extLst>
+          </p:cNvPr>
+          <p:cNvSpPr/>
+          <p:nvPr/>
+        </p:nvSpPr>
+        <p:spPr>
+          <a:xfrm rot="5400000">
+            <a:off x="3719879" y="3726757"/>
+            <a:ext cx="143736" cy="804672"/>
+          </a:xfrm>
+          <a:prstGeom prst="downArrow">
+            <a:avLst/>
+          </a:prstGeom>
+        </p:spPr>
+        <p:style>
+          <a:lnRef idx="2">
+            <a:schemeClr val="accent1">
+              <a:shade val="50000"/>
+            </a:schemeClr>
+          </a:lnRef>
+          <a:fillRef idx="1">
+            <a:schemeClr val="accent1"/>
+          </a:fillRef>
+          <a:effectRef idx="0">
+            <a:schemeClr val="accent1"/>
+          </a:effectRef>
+          <a:fontRef idx="minor">
+            <a:schemeClr val="lt1"/>
+          </a:fontRef>
+        </p:style>
+        <p:txBody>
+          <a:bodyPr rtlCol="0" anchor="ctr"/>
+          <a:lstStyle/>
+          <a:p>
+            <a:pPr algn="ctr"/>
+            <a:endParaRPr lang="en-US"/>
+          </a:p>
+        </p:txBody>
+      </p:sp>
+      <p:sp>
+        <p:nvSpPr>
+          <p:cNvPr id="6" name="Arrow: Curved Right 5">
+            <a:extLst>
+              <a:ext uri="{FF2B5EF4-FFF2-40B4-BE49-F238E27FC236}">
+                <a16:creationId xmlns:a16="http://schemas.microsoft.com/office/drawing/2014/main" id="{F888CAFB-2DAB-42E7-BF5D-13827D8C8131}"/>
+              </a:ext>
+            </a:extLst>
+          </p:cNvPr>
+          <p:cNvSpPr/>
+          <p:nvPr/>
+        </p:nvSpPr>
+        <p:spPr>
+          <a:xfrm rot="13560154" flipH="1">
+            <a:off x="4779050" y="1825981"/>
+            <a:ext cx="885135" cy="2256002"/>
+          </a:xfrm>
+          <a:prstGeom prst="curvedRightArrow">
+            <a:avLst>
+              <a:gd name="adj1" fmla="val 25000"/>
+              <a:gd name="adj2" fmla="val 46373"/>
+              <a:gd name="adj3" fmla="val 25000"/>
+            </a:avLst>
+          </a:prstGeom>
+        </p:spPr>
+        <p:style>
+          <a:lnRef idx="2">
+            <a:schemeClr val="accent1">
+              <a:shade val="50000"/>
+            </a:schemeClr>
+          </a:lnRef>
+          <a:fillRef idx="1">
+            <a:schemeClr val="accent1"/>
+          </a:fillRef>
+          <a:effectRef idx="0">
+            <a:schemeClr val="accent1"/>
+          </a:effectRef>
+          <a:fontRef idx="minor">
+            <a:schemeClr val="lt1"/>
+          </a:fontRef>
+        </p:style>
+        <p:txBody>
+          <a:bodyPr rtlCol="0" anchor="ctr"/>
+          <a:lstStyle/>
+          <a:p>
+            <a:pPr algn="ctr"/>
+            <a:endParaRPr lang="en-US">
+              <a:solidFill>
+                <a:schemeClr val="tx1"/>
+              </a:solidFill>
+            </a:endParaRPr>
+          </a:p>
+        </p:txBody>
+      </p:sp>
+      <p:sp>
+        <p:nvSpPr>
+          <p:cNvPr id="42" name="Arrow: Curved Right 41">
+            <a:extLst>
+              <a:ext uri="{FF2B5EF4-FFF2-40B4-BE49-F238E27FC236}">
+                <a16:creationId xmlns:a16="http://schemas.microsoft.com/office/drawing/2014/main" id="{4BAE9F47-470D-47EA-858C-13ACF17EEB98}"/>
+              </a:ext>
+            </a:extLst>
+          </p:cNvPr>
+          <p:cNvSpPr/>
+          <p:nvPr/>
+        </p:nvSpPr>
+        <p:spPr>
+          <a:xfrm rot="2394137" flipH="1">
+            <a:off x="7736497" y="3679912"/>
+            <a:ext cx="784220" cy="1915615"/>
+          </a:xfrm>
+          <a:prstGeom prst="curvedRightArrow">
+            <a:avLst>
+              <a:gd name="adj1" fmla="val 25000"/>
+              <a:gd name="adj2" fmla="val 46373"/>
+              <a:gd name="adj3" fmla="val 25000"/>
+            </a:avLst>
+          </a:prstGeom>
+        </p:spPr>
+        <p:style>
+          <a:lnRef idx="2">
+            <a:schemeClr val="accent1">
+              <a:shade val="50000"/>
+            </a:schemeClr>
+          </a:lnRef>
+          <a:fillRef idx="1">
+            <a:schemeClr val="accent1"/>
+          </a:fillRef>
+          <a:effectRef idx="0">
+            <a:schemeClr val="accent1"/>
+          </a:effectRef>
+          <a:fontRef idx="minor">
+            <a:schemeClr val="lt1"/>
+          </a:fontRef>
+        </p:style>
+        <p:txBody>
+          <a:bodyPr rtlCol="0" anchor="ctr"/>
+          <a:lstStyle/>
+          <a:p>
+            <a:pPr algn="ctr"/>
+            <a:endParaRPr lang="en-US">
+              <a:solidFill>
+                <a:schemeClr val="tx1"/>
+              </a:solidFill>
+            </a:endParaRPr>
+          </a:p>
+        </p:txBody>
+      </p:sp>
+      <p:sp>
+        <p:nvSpPr>
+          <p:cNvPr id="39" name="Rectangle: Rounded Corners 38">
+            <a:extLst>
+              <a:ext uri="{FF2B5EF4-FFF2-40B4-BE49-F238E27FC236}">
+                <a16:creationId xmlns:a16="http://schemas.microsoft.com/office/drawing/2014/main" id="{A590273D-62F1-4499-B1BD-91DFFDCB8744}"/>
+              </a:ext>
+            </a:extLst>
+          </p:cNvPr>
+          <p:cNvSpPr/>
+          <p:nvPr/>
+        </p:nvSpPr>
+        <p:spPr>
+          <a:xfrm>
+            <a:off x="6201212" y="1916707"/>
+            <a:ext cx="2262940" cy="2096397"/>
+          </a:xfrm>
+          <a:prstGeom prst="roundRect">
+            <a:avLst/>
+          </a:prstGeom>
+        </p:spPr>
+        <p:style>
+          <a:lnRef idx="2">
+            <a:schemeClr val="accent1">
+              <a:shade val="50000"/>
+            </a:schemeClr>
+          </a:lnRef>
+          <a:fillRef idx="1">
+            <a:schemeClr val="accent1"/>
+          </a:fillRef>
+          <a:effectRef idx="0">
+            <a:schemeClr val="accent1"/>
+          </a:effectRef>
+          <a:fontRef idx="minor">
+            <a:schemeClr val="lt1"/>
+          </a:fontRef>
+        </p:style>
+        <p:txBody>
+          <a:bodyPr rtlCol="0" anchor="ctr"/>
+          <a:lstStyle/>
+          <a:p>
+            <a:pPr algn="ctr"/>
+            <a:endParaRPr lang="en-US" dirty="0"/>
+          </a:p>
+        </p:txBody>
+      </p:sp>
+      <p:sp>
+        <p:nvSpPr>
+          <p:cNvPr id="2" name="Title 1">
+            <a:extLst>
+              <a:ext uri="{FF2B5EF4-FFF2-40B4-BE49-F238E27FC236}">
+                <a16:creationId xmlns:a16="http://schemas.microsoft.com/office/drawing/2014/main" id="{0D157F11-29CC-473A-B5A3-CC53D182D2B8}"/>
+              </a:ext>
+            </a:extLst>
+          </p:cNvPr>
+          <p:cNvSpPr>
+            <a:spLocks noGrp="1"/>
+          </p:cNvSpPr>
+          <p:nvPr>
+            <p:ph type="title"/>
+          </p:nvPr>
+        </p:nvSpPr>
+        <p:spPr/>
+        <p:txBody>
+          <a:bodyPr/>
+          <a:lstStyle/>
+          <a:p>
+            <a:r>
+              <a:rPr lang="en-AU" dirty="0"/>
+              <a:t>Hybrid framework</a:t>
+            </a:r>
+          </a:p>
+        </p:txBody>
+      </p:sp>
+      <p:sp>
+        <p:nvSpPr>
+          <p:cNvPr id="4" name="Rectangle 3">
+            <a:extLst>
+              <a:ext uri="{FF2B5EF4-FFF2-40B4-BE49-F238E27FC236}">
+                <a16:creationId xmlns:a16="http://schemas.microsoft.com/office/drawing/2014/main" id="{E4AD2ED0-2B36-40BB-BC0A-F3FEB8EC9E27}"/>
+              </a:ext>
+            </a:extLst>
+          </p:cNvPr>
+          <p:cNvSpPr/>
+          <p:nvPr/>
+        </p:nvSpPr>
+        <p:spPr>
+          <a:xfrm>
+            <a:off x="2595482" y="1211563"/>
+            <a:ext cx="6776477" cy="400110"/>
+          </a:xfrm>
+          <a:prstGeom prst="rect">
+            <a:avLst/>
+          </a:prstGeom>
+        </p:spPr>
+        <p:txBody>
+          <a:bodyPr wrap="square">
+            <a:spAutoFit/>
+          </a:bodyPr>
+          <a:lstStyle/>
+          <a:p>
+            <a:pPr algn="ctr"/>
+            <a:r>
+              <a:rPr lang="en-US" sz="2000" dirty="0">
+                <a:latin typeface="+mj-lt"/>
+              </a:rPr>
+              <a:t>Hybrid framework</a:t>
+            </a:r>
+          </a:p>
+        </p:txBody>
+      </p:sp>
+      <p:sp>
+        <p:nvSpPr>
+          <p:cNvPr id="3" name="Rectangle: Rounded Corners 2">
+            <a:extLst>
+              <a:ext uri="{FF2B5EF4-FFF2-40B4-BE49-F238E27FC236}">
+                <a16:creationId xmlns:a16="http://schemas.microsoft.com/office/drawing/2014/main" id="{5B44686C-8AE7-4715-98AF-6F9FAC921A8C}"/>
+              </a:ext>
+            </a:extLst>
+          </p:cNvPr>
+          <p:cNvSpPr/>
+          <p:nvPr/>
+        </p:nvSpPr>
+        <p:spPr>
+          <a:xfrm>
+            <a:off x="4068990" y="3714881"/>
+            <a:ext cx="1259320" cy="888986"/>
+          </a:xfrm>
+          <a:prstGeom prst="roundRect">
+            <a:avLst/>
+          </a:prstGeom>
+        </p:spPr>
+        <p:style>
+          <a:lnRef idx="2">
+            <a:schemeClr val="accent1">
+              <a:shade val="50000"/>
+            </a:schemeClr>
+          </a:lnRef>
+          <a:fillRef idx="1">
+            <a:schemeClr val="accent1"/>
+          </a:fillRef>
+          <a:effectRef idx="0">
+            <a:schemeClr val="accent1"/>
+          </a:effectRef>
+          <a:fontRef idx="minor">
+            <a:schemeClr val="lt1"/>
+          </a:fontRef>
+        </p:style>
+        <p:txBody>
+          <a:bodyPr rtlCol="0" anchor="ctr"/>
+          <a:lstStyle/>
+          <a:p>
+            <a:pPr algn="ctr"/>
+            <a:r>
+              <a:rPr lang="en-US" dirty="0" err="1"/>
+              <a:t>TestDriver</a:t>
+            </a:r>
+            <a:endParaRPr lang="en-US" dirty="0"/>
+          </a:p>
+        </p:txBody>
+      </p:sp>
+      <p:sp>
+        <p:nvSpPr>
+          <p:cNvPr id="32" name="Rectangle: Rounded Corners 31">
+            <a:extLst>
+              <a:ext uri="{FF2B5EF4-FFF2-40B4-BE49-F238E27FC236}">
+                <a16:creationId xmlns:a16="http://schemas.microsoft.com/office/drawing/2014/main" id="{7366A9AF-5534-45A1-B9F1-B0F86B5B737E}"/>
+              </a:ext>
+            </a:extLst>
+          </p:cNvPr>
+          <p:cNvSpPr/>
+          <p:nvPr/>
+        </p:nvSpPr>
+        <p:spPr>
+          <a:xfrm>
+            <a:off x="7389425" y="3081958"/>
+            <a:ext cx="950141" cy="584200"/>
+          </a:xfrm>
+          <a:prstGeom prst="roundRect">
+            <a:avLst/>
+          </a:prstGeom>
+        </p:spPr>
+        <p:style>
+          <a:lnRef idx="2">
+            <a:schemeClr val="accent1">
+              <a:shade val="50000"/>
+            </a:schemeClr>
+          </a:lnRef>
+          <a:fillRef idx="1">
+            <a:schemeClr val="accent1"/>
+          </a:fillRef>
+          <a:effectRef idx="0">
+            <a:schemeClr val="accent1"/>
+          </a:effectRef>
+          <a:fontRef idx="minor">
+            <a:schemeClr val="lt1"/>
+          </a:fontRef>
+        </p:style>
+        <p:txBody>
+          <a:bodyPr rtlCol="0" anchor="ctr"/>
+          <a:lstStyle/>
+          <a:p>
+            <a:pPr algn="ctr"/>
+            <a:r>
+              <a:rPr lang="en-US" dirty="0"/>
+              <a:t>Library</a:t>
+            </a:r>
+          </a:p>
+        </p:txBody>
+      </p:sp>
+      <p:sp>
+        <p:nvSpPr>
+          <p:cNvPr id="36" name="Rectangle: Rounded Corners 35">
+            <a:extLst>
+              <a:ext uri="{FF2B5EF4-FFF2-40B4-BE49-F238E27FC236}">
+                <a16:creationId xmlns:a16="http://schemas.microsoft.com/office/drawing/2014/main" id="{1B295B4B-62EA-416F-9A8A-A91F9115530F}"/>
+              </a:ext>
+            </a:extLst>
+          </p:cNvPr>
+          <p:cNvSpPr/>
+          <p:nvPr/>
+        </p:nvSpPr>
+        <p:spPr>
+          <a:xfrm>
+            <a:off x="6236472" y="4625350"/>
+            <a:ext cx="1077143" cy="612120"/>
+          </a:xfrm>
+          <a:prstGeom prst="roundRect">
+            <a:avLst/>
+          </a:prstGeom>
+        </p:spPr>
+        <p:style>
+          <a:lnRef idx="2">
+            <a:schemeClr val="accent1">
+              <a:shade val="50000"/>
+            </a:schemeClr>
+          </a:lnRef>
+          <a:fillRef idx="1">
+            <a:schemeClr val="accent1"/>
+          </a:fillRef>
+          <a:effectRef idx="0">
+            <a:schemeClr val="accent1"/>
+          </a:effectRef>
+          <a:fontRef idx="minor">
+            <a:schemeClr val="lt1"/>
+          </a:fontRef>
+        </p:style>
+        <p:txBody>
+          <a:bodyPr rtlCol="0" anchor="ctr"/>
+          <a:lstStyle/>
+          <a:p>
+            <a:pPr algn="ctr"/>
+            <a:r>
+              <a:rPr lang="en-US" sz="1600" dirty="0"/>
+              <a:t>Reporting</a:t>
+            </a:r>
+          </a:p>
+        </p:txBody>
+      </p:sp>
+      <p:sp>
+        <p:nvSpPr>
+          <p:cNvPr id="37" name="Cloud 36">
+            <a:extLst>
+              <a:ext uri="{FF2B5EF4-FFF2-40B4-BE49-F238E27FC236}">
+                <a16:creationId xmlns:a16="http://schemas.microsoft.com/office/drawing/2014/main" id="{154EA615-4092-4946-98E5-7597856702D3}"/>
+              </a:ext>
+            </a:extLst>
+          </p:cNvPr>
+          <p:cNvSpPr/>
+          <p:nvPr/>
+        </p:nvSpPr>
+        <p:spPr>
+          <a:xfrm>
+            <a:off x="1630139" y="3744779"/>
+            <a:ext cx="1791722" cy="768628"/>
+          </a:xfrm>
+          <a:prstGeom prst="cloud">
+            <a:avLst/>
+          </a:prstGeom>
+        </p:spPr>
+        <p:style>
+          <a:lnRef idx="2">
+            <a:schemeClr val="accent1">
+              <a:shade val="50000"/>
+            </a:schemeClr>
+          </a:lnRef>
+          <a:fillRef idx="1">
+            <a:schemeClr val="accent1"/>
+          </a:fillRef>
+          <a:effectRef idx="0">
+            <a:schemeClr val="accent1"/>
+          </a:effectRef>
+          <a:fontRef idx="minor">
+            <a:schemeClr val="lt1"/>
+          </a:fontRef>
+        </p:style>
+        <p:txBody>
+          <a:bodyPr rtlCol="0" anchor="ctr"/>
+          <a:lstStyle/>
+          <a:p>
+            <a:pPr algn="ctr"/>
+            <a:endParaRPr lang="en-US" sz="1000" dirty="0"/>
+          </a:p>
+        </p:txBody>
+      </p:sp>
+      <p:sp>
+        <p:nvSpPr>
+          <p:cNvPr id="38" name="Cloud 37">
+            <a:extLst>
+              <a:ext uri="{FF2B5EF4-FFF2-40B4-BE49-F238E27FC236}">
+                <a16:creationId xmlns:a16="http://schemas.microsoft.com/office/drawing/2014/main" id="{F4D1AC7D-12A9-42C5-A69E-6918A03D9686}"/>
+              </a:ext>
+            </a:extLst>
+          </p:cNvPr>
+          <p:cNvSpPr/>
+          <p:nvPr/>
+        </p:nvSpPr>
+        <p:spPr>
+          <a:xfrm>
+            <a:off x="1557867" y="3996267"/>
+            <a:ext cx="1791722" cy="768628"/>
+          </a:xfrm>
+          <a:prstGeom prst="cloud">
+            <a:avLst/>
+          </a:prstGeom>
+        </p:spPr>
+        <p:style>
+          <a:lnRef idx="2">
+            <a:schemeClr val="accent1">
+              <a:shade val="50000"/>
+            </a:schemeClr>
+          </a:lnRef>
+          <a:fillRef idx="1">
+            <a:schemeClr val="accent1"/>
+          </a:fillRef>
+          <a:effectRef idx="0">
+            <a:schemeClr val="accent1"/>
+          </a:effectRef>
+          <a:fontRef idx="minor">
+            <a:schemeClr val="lt1"/>
+          </a:fontRef>
+        </p:style>
+        <p:txBody>
+          <a:bodyPr rtlCol="0" anchor="ctr"/>
+          <a:lstStyle/>
+          <a:p>
+            <a:pPr algn="ctr"/>
+            <a:r>
+              <a:rPr lang="en-US" sz="1000" dirty="0"/>
+              <a:t>Application under Test</a:t>
+            </a:r>
+          </a:p>
+        </p:txBody>
+      </p:sp>
+      <p:sp>
+        <p:nvSpPr>
+          <p:cNvPr id="34" name="Rectangle: Rounded Corners 33">
+            <a:extLst>
+              <a:ext uri="{FF2B5EF4-FFF2-40B4-BE49-F238E27FC236}">
+                <a16:creationId xmlns:a16="http://schemas.microsoft.com/office/drawing/2014/main" id="{E782E5BF-6A5C-45AB-9951-138AFB642CC0}"/>
+              </a:ext>
+            </a:extLst>
+          </p:cNvPr>
+          <p:cNvSpPr/>
+          <p:nvPr/>
+        </p:nvSpPr>
+        <p:spPr>
+          <a:xfrm>
+            <a:off x="6406976" y="2240651"/>
+            <a:ext cx="982449" cy="523222"/>
+          </a:xfrm>
+          <a:prstGeom prst="roundRect">
+            <a:avLst/>
+          </a:prstGeom>
+        </p:spPr>
+        <p:style>
+          <a:lnRef idx="2">
+            <a:schemeClr val="accent1">
+              <a:shade val="50000"/>
+            </a:schemeClr>
+          </a:lnRef>
+          <a:fillRef idx="1">
+            <a:schemeClr val="accent1"/>
+          </a:fillRef>
+          <a:effectRef idx="0">
+            <a:schemeClr val="accent1"/>
+          </a:effectRef>
+          <a:fontRef idx="minor">
+            <a:schemeClr val="lt1"/>
+          </a:fontRef>
+        </p:style>
+        <p:txBody>
+          <a:bodyPr rtlCol="0" anchor="ctr"/>
+          <a:lstStyle/>
+          <a:p>
+            <a:pPr algn="ctr"/>
+            <a:r>
+              <a:rPr lang="en-US" dirty="0"/>
+              <a:t>Test Data</a:t>
+            </a:r>
+          </a:p>
+        </p:txBody>
+      </p:sp>
+      <p:sp>
+        <p:nvSpPr>
+          <p:cNvPr id="35" name="Rectangle: Rounded Corners 34">
+            <a:extLst>
+              <a:ext uri="{FF2B5EF4-FFF2-40B4-BE49-F238E27FC236}">
+                <a16:creationId xmlns:a16="http://schemas.microsoft.com/office/drawing/2014/main" id="{3B86D163-B594-4D42-9508-853C53F7DD49}"/>
+              </a:ext>
+            </a:extLst>
+          </p:cNvPr>
+          <p:cNvSpPr/>
+          <p:nvPr/>
+        </p:nvSpPr>
+        <p:spPr>
+          <a:xfrm>
+            <a:off x="6267112" y="3068907"/>
+            <a:ext cx="982449" cy="566762"/>
+          </a:xfrm>
+          <a:prstGeom prst="roundRect">
+            <a:avLst/>
+          </a:prstGeom>
+        </p:spPr>
+        <p:style>
+          <a:lnRef idx="2">
+            <a:schemeClr val="accent1">
+              <a:shade val="50000"/>
+            </a:schemeClr>
+          </a:lnRef>
+          <a:fillRef idx="1">
+            <a:schemeClr val="accent1"/>
+          </a:fillRef>
+          <a:effectRef idx="0">
+            <a:schemeClr val="accent1"/>
+          </a:effectRef>
+          <a:fontRef idx="minor">
+            <a:schemeClr val="lt1"/>
+          </a:fontRef>
+        </p:style>
+        <p:txBody>
+          <a:bodyPr rtlCol="0" anchor="ctr"/>
+          <a:lstStyle/>
+          <a:p>
+            <a:pPr algn="ctr"/>
+            <a:r>
+              <a:rPr lang="en-US" dirty="0"/>
+              <a:t>Test Scripts</a:t>
+            </a:r>
+          </a:p>
+        </p:txBody>
+      </p:sp>
+      <p:sp>
+        <p:nvSpPr>
+          <p:cNvPr id="40" name="Rectangle 39">
+            <a:extLst>
+              <a:ext uri="{FF2B5EF4-FFF2-40B4-BE49-F238E27FC236}">
+                <a16:creationId xmlns:a16="http://schemas.microsoft.com/office/drawing/2014/main" id="{38A2D257-7771-46A8-83E4-EB5BFCFDBCA1}"/>
+              </a:ext>
+            </a:extLst>
+          </p:cNvPr>
+          <p:cNvSpPr/>
+          <p:nvPr/>
+        </p:nvSpPr>
+        <p:spPr>
+          <a:xfrm rot="10800000" flipV="1">
+            <a:off x="7864495" y="1639708"/>
+            <a:ext cx="4176834" cy="276999"/>
+          </a:xfrm>
+          <a:prstGeom prst="rect">
+            <a:avLst/>
+          </a:prstGeom>
+        </p:spPr>
+        <p:txBody>
+          <a:bodyPr wrap="square">
+            <a:spAutoFit/>
+          </a:bodyPr>
+          <a:lstStyle/>
+          <a:p>
+            <a:r>
+              <a:rPr lang="en-US" sz="1200" dirty="0">
+                <a:latin typeface="+mj-lt"/>
+              </a:rPr>
+              <a:t>Test scripts and resources are all controlled by the test driver</a:t>
+            </a:r>
+          </a:p>
+        </p:txBody>
+      </p:sp>
+      <p:sp>
+        <p:nvSpPr>
+          <p:cNvPr id="41" name="Rectangle 40">
+            <a:extLst>
+              <a:ext uri="{FF2B5EF4-FFF2-40B4-BE49-F238E27FC236}">
+                <a16:creationId xmlns:a16="http://schemas.microsoft.com/office/drawing/2014/main" id="{82BE8B3A-8DF9-4CE8-A557-788881C9B4C5}"/>
+              </a:ext>
+            </a:extLst>
+          </p:cNvPr>
+          <p:cNvSpPr/>
+          <p:nvPr/>
+        </p:nvSpPr>
+        <p:spPr>
+          <a:xfrm rot="10800000" flipV="1">
+            <a:off x="6758336" y="5252329"/>
+            <a:ext cx="3694778" cy="261610"/>
+          </a:xfrm>
+          <a:prstGeom prst="rect">
+            <a:avLst/>
+          </a:prstGeom>
+        </p:spPr>
+        <p:txBody>
+          <a:bodyPr wrap="square">
+            <a:spAutoFit/>
+          </a:bodyPr>
+          <a:lstStyle/>
+          <a:p>
+            <a:r>
+              <a:rPr lang="en-US" sz="1100" dirty="0">
+                <a:latin typeface="+mj-lt"/>
+              </a:rPr>
+              <a:t>Reports will be stored in the framework too</a:t>
+            </a:r>
+          </a:p>
+        </p:txBody>
+      </p:sp>
+    </p:spTree>
+    <p:extLst>
+      <p:ext uri="{BB962C8B-B14F-4D97-AF65-F5344CB8AC3E}">
+        <p14:creationId xmlns:p14="http://schemas.microsoft.com/office/powerpoint/2010/main" val="1363267587"/>
+      </p:ext>
+    </p:extLst>
+  </p:cSld>
+  <p:clrMapOvr>
+    <a:masterClrMapping/>
+  </p:clrMapOvr>
+</p:sld>
+</file>
+
+<file path=ppt/slides/slide8.xml><?xml version="1.0" encoding="utf-8"?>
+<p:sld xmlns:a="http://schemas.openxmlformats.org/drawingml/2006/main" xmlns:r="http://schemas.openxmlformats.org/officeDocument/2006/relationships" xmlns:p="http://schemas.openxmlformats.org/presentationml/2006/main">
+  <p:cSld>
+    <p:spTree>
+      <p:nvGrpSpPr>
+        <p:cNvPr id="1" name=""/>
+        <p:cNvGrpSpPr/>
+        <p:nvPr/>
+      </p:nvGrpSpPr>
+      <p:grpSpPr>
+        <a:xfrm>
+          <a:off x="0" y="0"/>
+          <a:ext cx="0" cy="0"/>
+          <a:chOff x="0" y="0"/>
+          <a:chExt cx="0" cy="0"/>
+        </a:xfrm>
+      </p:grpSpPr>
+      <p:sp>
+        <p:nvSpPr>
+          <p:cNvPr id="2" name="Title 1">
+            <a:extLst>
+              <a:ext uri="{FF2B5EF4-FFF2-40B4-BE49-F238E27FC236}">
+                <a16:creationId xmlns:a16="http://schemas.microsoft.com/office/drawing/2014/main" id="{0D157F11-29CC-473A-B5A3-CC53D182D2B8}"/>
+              </a:ext>
+            </a:extLst>
+          </p:cNvPr>
+          <p:cNvSpPr>
+            <a:spLocks noGrp="1"/>
+          </p:cNvSpPr>
+          <p:nvPr>
+            <p:ph type="title"/>
+          </p:nvPr>
+        </p:nvSpPr>
+        <p:spPr/>
+        <p:txBody>
+          <a:bodyPr>
+            <a:normAutofit/>
+          </a:bodyPr>
+          <a:lstStyle/>
+          <a:p>
+            <a:r>
+              <a:rPr lang="en-AU" dirty="0"/>
+              <a:t>Reporting tools</a:t>
+            </a:r>
+          </a:p>
+        </p:txBody>
+      </p:sp>
+      <p:sp>
+        <p:nvSpPr>
+          <p:cNvPr id="3" name="Rectangle 2">
+            <a:extLst>
+              <a:ext uri="{FF2B5EF4-FFF2-40B4-BE49-F238E27FC236}">
+                <a16:creationId xmlns:a16="http://schemas.microsoft.com/office/drawing/2014/main" id="{AEA3803E-49D8-4C22-B607-634BEDABD476}"/>
+              </a:ext>
+            </a:extLst>
+          </p:cNvPr>
+          <p:cNvSpPr/>
+          <p:nvPr/>
+        </p:nvSpPr>
+        <p:spPr>
+          <a:xfrm rot="10800000" flipV="1">
+            <a:off x="966236" y="5304659"/>
+            <a:ext cx="5031866" cy="261610"/>
+          </a:xfrm>
+          <a:prstGeom prst="rect">
+            <a:avLst/>
+          </a:prstGeom>
+        </p:spPr>
+        <p:txBody>
+          <a:bodyPr wrap="square">
+            <a:spAutoFit/>
+          </a:bodyPr>
+          <a:lstStyle/>
+          <a:p>
+            <a:r>
+              <a:rPr lang="en-US" sz="1050" dirty="0">
+                <a:latin typeface="+mj-lt"/>
+              </a:rPr>
+              <a:t>Allure Reports</a:t>
+            </a:r>
+          </a:p>
+        </p:txBody>
+      </p:sp>
+      <p:sp>
+        <p:nvSpPr>
+          <p:cNvPr id="4" name="Rectangle 3">
+            <a:extLst>
+              <a:ext uri="{FF2B5EF4-FFF2-40B4-BE49-F238E27FC236}">
+                <a16:creationId xmlns:a16="http://schemas.microsoft.com/office/drawing/2014/main" id="{E7F3CB9A-81F2-46E0-A4F9-D5E1359243B5}"/>
+              </a:ext>
+            </a:extLst>
+          </p:cNvPr>
+          <p:cNvSpPr/>
+          <p:nvPr/>
+        </p:nvSpPr>
+        <p:spPr>
+          <a:xfrm rot="10800000" flipV="1">
+            <a:off x="858266" y="1825714"/>
+            <a:ext cx="5031866" cy="261610"/>
+          </a:xfrm>
+          <a:prstGeom prst="rect">
+            <a:avLst/>
+          </a:prstGeom>
+        </p:spPr>
+        <p:txBody>
+          <a:bodyPr wrap="square">
+            <a:spAutoFit/>
+          </a:bodyPr>
+          <a:lstStyle/>
+          <a:p>
+            <a:r>
+              <a:rPr lang="en-US" sz="1050" dirty="0">
+                <a:latin typeface="+mj-lt"/>
+              </a:rPr>
+              <a:t>TestNG Reports (</a:t>
+            </a:r>
+            <a:r>
+              <a:rPr lang="en-US" sz="1050" dirty="0" err="1">
+                <a:latin typeface="+mj-lt"/>
+              </a:rPr>
+              <a:t>ReportNG</a:t>
+            </a:r>
+            <a:r>
+              <a:rPr lang="en-US" sz="1050" dirty="0">
+                <a:latin typeface="+mj-lt"/>
+              </a:rPr>
+              <a:t>)</a:t>
+            </a:r>
+          </a:p>
+        </p:txBody>
+      </p:sp>
+      <p:sp>
+        <p:nvSpPr>
+          <p:cNvPr id="5" name="Rectangle 4">
+            <a:extLst>
+              <a:ext uri="{FF2B5EF4-FFF2-40B4-BE49-F238E27FC236}">
+                <a16:creationId xmlns:a16="http://schemas.microsoft.com/office/drawing/2014/main" id="{C88A49CC-7721-4B52-AB08-ACF5390A01F0}"/>
+              </a:ext>
+            </a:extLst>
+          </p:cNvPr>
+          <p:cNvSpPr/>
+          <p:nvPr/>
+        </p:nvSpPr>
+        <p:spPr>
+          <a:xfrm rot="10800000" flipV="1">
+            <a:off x="966237" y="3595350"/>
+            <a:ext cx="5031866" cy="261610"/>
+          </a:xfrm>
+          <a:prstGeom prst="rect">
+            <a:avLst/>
+          </a:prstGeom>
+        </p:spPr>
+        <p:txBody>
+          <a:bodyPr wrap="square">
+            <a:spAutoFit/>
+          </a:bodyPr>
+          <a:lstStyle/>
+          <a:p>
+            <a:r>
+              <a:rPr lang="en-US" sz="1050" dirty="0">
+                <a:latin typeface="+mj-lt"/>
+              </a:rPr>
+              <a:t>Extent Reports</a:t>
+            </a:r>
+          </a:p>
+        </p:txBody>
+      </p:sp>
+      <p:pic>
+        <p:nvPicPr>
+          <p:cNvPr id="4098" name="Picture 2" descr="Report overview page.">
+            <a:extLst>
+              <a:ext uri="{FF2B5EF4-FFF2-40B4-BE49-F238E27FC236}">
+                <a16:creationId xmlns:a16="http://schemas.microsoft.com/office/drawing/2014/main" id="{C3F7D341-029A-431B-82F3-0F13034089AA}"/>
+              </a:ext>
+            </a:extLst>
+          </p:cNvPr>
+          <p:cNvPicPr>
+            <a:picLocks noChangeAspect="1" noChangeArrowheads="1"/>
+          </p:cNvPicPr>
+          <p:nvPr/>
+        </p:nvPicPr>
+        <p:blipFill>
+          <a:blip r:embed="rId2">
+            <a:extLst>
+              <a:ext uri="{28A0092B-C50C-407E-A947-70E740481C1C}">
+                <a14:useLocalDpi xmlns:a14="http://schemas.microsoft.com/office/drawing/2010/main" val="0"/>
+              </a:ext>
+            </a:extLst>
+          </a:blip>
+          <a:srcRect/>
+          <a:stretch>
+            <a:fillRect/>
+          </a:stretch>
+        </p:blipFill>
+        <p:spPr bwMode="auto">
+          <a:xfrm>
+            <a:off x="2488406" y="1199196"/>
+            <a:ext cx="4533371" cy="1525910"/>
+          </a:xfrm>
+          <a:prstGeom prst="rect">
+            <a:avLst/>
+          </a:prstGeom>
+          <a:noFill/>
+          <a:extLst>
+            <a:ext uri="{909E8E84-426E-40DD-AFC4-6F175D3DCCD1}">
+              <a14:hiddenFill xmlns:a14="http://schemas.microsoft.com/office/drawing/2010/main">
+                <a:solidFill>
+                  <a:srgbClr val="FFFFFF"/>
+                </a:solidFill>
+              </a14:hiddenFill>
+            </a:ext>
+          </a:extLst>
+        </p:spPr>
+      </p:pic>
+      <p:pic>
+        <p:nvPicPr>
+          <p:cNvPr id="8" name="Picture 4">
+            <a:extLst>
+              <a:ext uri="{FF2B5EF4-FFF2-40B4-BE49-F238E27FC236}">
+                <a16:creationId xmlns:a16="http://schemas.microsoft.com/office/drawing/2014/main" id="{A4E07B0B-00EA-4761-B52F-1782ADD5271C}"/>
+              </a:ext>
+            </a:extLst>
+          </p:cNvPr>
+          <p:cNvPicPr>
+            <a:picLocks noChangeAspect="1" noChangeArrowheads="1"/>
+          </p:cNvPicPr>
+          <p:nvPr/>
+        </p:nvPicPr>
+        <p:blipFill rotWithShape="1">
+          <a:blip r:embed="rId3">
+            <a:extLst>
+              <a:ext uri="{28A0092B-C50C-407E-A947-70E740481C1C}">
+                <a14:useLocalDpi xmlns:a14="http://schemas.microsoft.com/office/drawing/2010/main" val="0"/>
+              </a:ext>
+            </a:extLst>
+          </a:blip>
+          <a:srcRect b="36762"/>
+          <a:stretch/>
+        </p:blipFill>
+        <p:spPr bwMode="auto">
+          <a:xfrm>
+            <a:off x="2488406" y="2953042"/>
+            <a:ext cx="4617718" cy="1500057"/>
+          </a:xfrm>
+          <a:prstGeom prst="rect">
+            <a:avLst/>
+          </a:prstGeom>
+          <a:noFill/>
+          <a:extLst>
+            <a:ext uri="{909E8E84-426E-40DD-AFC4-6F175D3DCCD1}">
+              <a14:hiddenFill xmlns:a14="http://schemas.microsoft.com/office/drawing/2010/main">
+                <a:solidFill>
+                  <a:srgbClr val="FFFFFF"/>
+                </a:solidFill>
+              </a14:hiddenFill>
+            </a:ext>
+          </a:extLst>
+        </p:spPr>
+      </p:pic>
+      <p:pic>
+        <p:nvPicPr>
+          <p:cNvPr id="4102" name="Picture 6" descr="Overview Page">
+            <a:extLst>
+              <a:ext uri="{FF2B5EF4-FFF2-40B4-BE49-F238E27FC236}">
+                <a16:creationId xmlns:a16="http://schemas.microsoft.com/office/drawing/2014/main" id="{77E3D152-7FCD-4EAE-9DAD-65E6CED7D905}"/>
+              </a:ext>
+            </a:extLst>
+          </p:cNvPr>
+          <p:cNvPicPr>
+            <a:picLocks noChangeAspect="1" noChangeArrowheads="1"/>
+          </p:cNvPicPr>
+          <p:nvPr/>
+        </p:nvPicPr>
+        <p:blipFill>
+          <a:blip r:embed="rId4">
+            <a:extLst>
+              <a:ext uri="{28A0092B-C50C-407E-A947-70E740481C1C}">
+                <a14:useLocalDpi xmlns:a14="http://schemas.microsoft.com/office/drawing/2010/main" val="0"/>
+              </a:ext>
+            </a:extLst>
+          </a:blip>
+          <a:srcRect/>
+          <a:stretch>
+            <a:fillRect/>
+          </a:stretch>
+        </p:blipFill>
+        <p:spPr bwMode="auto">
+          <a:xfrm>
+            <a:off x="2488406" y="4706505"/>
+            <a:ext cx="3509697" cy="1708260"/>
+          </a:xfrm>
+          <a:prstGeom prst="rect">
+            <a:avLst/>
+          </a:prstGeom>
+          <a:noFill/>
+          <a:extLst>
+            <a:ext uri="{909E8E84-426E-40DD-AFC4-6F175D3DCCD1}">
+              <a14:hiddenFill xmlns:a14="http://schemas.microsoft.com/office/drawing/2010/main">
+                <a:solidFill>
+                  <a:srgbClr val="FFFFFF"/>
+                </a:solidFill>
+              </a14:hiddenFill>
+            </a:ext>
+          </a:extLst>
+        </p:spPr>
+      </p:pic>
+      <p:sp>
+        <p:nvSpPr>
+          <p:cNvPr id="6" name="Rectangle: Rounded Corners 5">
+            <a:extLst>
+              <a:ext uri="{FF2B5EF4-FFF2-40B4-BE49-F238E27FC236}">
+                <a16:creationId xmlns:a16="http://schemas.microsoft.com/office/drawing/2014/main" id="{3F59BEF7-2EC2-4A0E-9C17-28321DED77CA}"/>
+              </a:ext>
+            </a:extLst>
+          </p:cNvPr>
+          <p:cNvSpPr/>
+          <p:nvPr/>
+        </p:nvSpPr>
+        <p:spPr>
+          <a:xfrm>
+            <a:off x="858266" y="1068405"/>
+            <a:ext cx="9437201" cy="1694346"/>
+          </a:xfrm>
+          <a:prstGeom prst="roundRect">
+            <a:avLst/>
+          </a:prstGeom>
+          <a:noFill/>
+        </p:spPr>
+        <p:style>
+          <a:lnRef idx="2">
+            <a:schemeClr val="accent1">
+              <a:shade val="50000"/>
+            </a:schemeClr>
+          </a:lnRef>
+          <a:fillRef idx="1">
+            <a:schemeClr val="accent1"/>
+          </a:fillRef>
+          <a:effectRef idx="0">
+            <a:schemeClr val="accent1"/>
+          </a:effectRef>
+          <a:fontRef idx="minor">
+            <a:schemeClr val="lt1"/>
+          </a:fontRef>
+        </p:style>
+        <p:txBody>
+          <a:bodyPr rtlCol="0" anchor="ctr"/>
+          <a:lstStyle/>
+          <a:p>
+            <a:pPr algn="ctr"/>
+            <a:endParaRPr lang="en-US"/>
+          </a:p>
+        </p:txBody>
+      </p:sp>
+      <p:sp>
+        <p:nvSpPr>
+          <p:cNvPr id="11" name="Rectangle: Rounded Corners 10">
+            <a:extLst>
+              <a:ext uri="{FF2B5EF4-FFF2-40B4-BE49-F238E27FC236}">
+                <a16:creationId xmlns:a16="http://schemas.microsoft.com/office/drawing/2014/main" id="{2A48F18E-8342-43A4-8C0A-F3521D047D53}"/>
+              </a:ext>
+            </a:extLst>
+          </p:cNvPr>
+          <p:cNvSpPr/>
+          <p:nvPr/>
+        </p:nvSpPr>
+        <p:spPr>
+          <a:xfrm>
+            <a:off x="858266" y="2855898"/>
+            <a:ext cx="9437201" cy="1694346"/>
+          </a:xfrm>
+          <a:prstGeom prst="roundRect">
+            <a:avLst/>
+          </a:prstGeom>
+          <a:noFill/>
+        </p:spPr>
+        <p:style>
+          <a:lnRef idx="2">
+            <a:schemeClr val="accent1">
+              <a:shade val="50000"/>
+            </a:schemeClr>
+          </a:lnRef>
+          <a:fillRef idx="1">
+            <a:schemeClr val="accent1"/>
+          </a:fillRef>
+          <a:effectRef idx="0">
+            <a:schemeClr val="accent1"/>
+          </a:effectRef>
+          <a:fontRef idx="minor">
+            <a:schemeClr val="lt1"/>
+          </a:fontRef>
+        </p:style>
+        <p:txBody>
+          <a:bodyPr rtlCol="0" anchor="ctr"/>
+          <a:lstStyle/>
+          <a:p>
+            <a:pPr algn="ctr"/>
+            <a:endParaRPr lang="en-US"/>
+          </a:p>
+        </p:txBody>
+      </p:sp>
+      <p:sp>
+        <p:nvSpPr>
+          <p:cNvPr id="12" name="Rectangle: Rounded Corners 11">
+            <a:extLst>
+              <a:ext uri="{FF2B5EF4-FFF2-40B4-BE49-F238E27FC236}">
+                <a16:creationId xmlns:a16="http://schemas.microsoft.com/office/drawing/2014/main" id="{047FCF6A-C42F-4769-BC10-19664BD3ED36}"/>
+              </a:ext>
+            </a:extLst>
+          </p:cNvPr>
+          <p:cNvSpPr/>
+          <p:nvPr/>
+        </p:nvSpPr>
+        <p:spPr>
+          <a:xfrm>
+            <a:off x="858266" y="4625534"/>
+            <a:ext cx="9437201" cy="1694346"/>
+          </a:xfrm>
+          <a:prstGeom prst="roundRect">
+            <a:avLst/>
+          </a:prstGeom>
+          <a:noFill/>
+        </p:spPr>
+        <p:style>
+          <a:lnRef idx="2">
+            <a:schemeClr val="accent1">
+              <a:shade val="50000"/>
+            </a:schemeClr>
+          </a:lnRef>
+          <a:fillRef idx="1">
+            <a:schemeClr val="accent1"/>
+          </a:fillRef>
+          <a:effectRef idx="0">
+            <a:schemeClr val="accent1"/>
+          </a:effectRef>
+          <a:fontRef idx="minor">
+            <a:schemeClr val="lt1"/>
+          </a:fontRef>
+        </p:style>
+        <p:txBody>
+          <a:bodyPr rtlCol="0" anchor="ctr"/>
+          <a:lstStyle/>
+          <a:p>
+            <a:pPr algn="ctr"/>
+            <a:endParaRPr lang="en-US"/>
+          </a:p>
+        </p:txBody>
+      </p:sp>
+      <p:sp>
+        <p:nvSpPr>
+          <p:cNvPr id="13" name="Rectangle 12">
+            <a:extLst>
+              <a:ext uri="{FF2B5EF4-FFF2-40B4-BE49-F238E27FC236}">
+                <a16:creationId xmlns:a16="http://schemas.microsoft.com/office/drawing/2014/main" id="{987E3CBE-5A12-4DBC-978D-339316BF8909}"/>
+              </a:ext>
+            </a:extLst>
+          </p:cNvPr>
+          <p:cNvSpPr/>
+          <p:nvPr/>
+        </p:nvSpPr>
+        <p:spPr>
+          <a:xfrm rot="10800000" flipV="1">
+            <a:off x="7106124" y="1425604"/>
+            <a:ext cx="5031866" cy="1061829"/>
+          </a:xfrm>
+          <a:prstGeom prst="rect">
+            <a:avLst/>
+          </a:prstGeom>
+        </p:spPr>
+        <p:txBody>
+          <a:bodyPr wrap="square">
+            <a:spAutoFit/>
+          </a:bodyPr>
+          <a:lstStyle/>
+          <a:p>
+            <a:r>
+              <a:rPr lang="en-US" sz="1050" dirty="0">
+                <a:latin typeface="+mj-lt"/>
+              </a:rPr>
+              <a:t>Pros:</a:t>
+            </a:r>
+          </a:p>
+          <a:p>
+            <a:endParaRPr lang="en-US" sz="1050" dirty="0">
+              <a:latin typeface="+mj-lt"/>
+            </a:endParaRPr>
+          </a:p>
+          <a:p>
+            <a:endParaRPr lang="en-US" sz="1050" dirty="0">
+              <a:latin typeface="+mj-lt"/>
+            </a:endParaRPr>
+          </a:p>
+          <a:p>
+            <a:endParaRPr lang="en-US" sz="1050" dirty="0">
+              <a:latin typeface="+mj-lt"/>
+            </a:endParaRPr>
+          </a:p>
+          <a:p>
+            <a:endParaRPr lang="en-US" sz="1050" dirty="0">
+              <a:latin typeface="+mj-lt"/>
+            </a:endParaRPr>
+          </a:p>
+          <a:p>
+            <a:r>
+              <a:rPr lang="en-US" sz="1050" dirty="0">
+                <a:latin typeface="+mj-lt"/>
+              </a:rPr>
+              <a:t>Cons:</a:t>
+            </a:r>
+          </a:p>
+        </p:txBody>
+      </p:sp>
+      <p:sp>
+        <p:nvSpPr>
+          <p:cNvPr id="14" name="Rectangle 13">
+            <a:extLst>
+              <a:ext uri="{FF2B5EF4-FFF2-40B4-BE49-F238E27FC236}">
+                <a16:creationId xmlns:a16="http://schemas.microsoft.com/office/drawing/2014/main" id="{8EA02588-08B7-409B-B833-03AA2DAD0777}"/>
+              </a:ext>
+            </a:extLst>
+          </p:cNvPr>
+          <p:cNvSpPr/>
+          <p:nvPr/>
+        </p:nvSpPr>
+        <p:spPr>
+          <a:xfrm rot="10800000" flipV="1">
+            <a:off x="7106124" y="3064435"/>
+            <a:ext cx="5031866" cy="1061829"/>
+          </a:xfrm>
+          <a:prstGeom prst="rect">
+            <a:avLst/>
+          </a:prstGeom>
+        </p:spPr>
+        <p:txBody>
+          <a:bodyPr wrap="square">
+            <a:spAutoFit/>
+          </a:bodyPr>
+          <a:lstStyle/>
+          <a:p>
+            <a:r>
+              <a:rPr lang="en-US" sz="1050" dirty="0">
+                <a:latin typeface="+mj-lt"/>
+              </a:rPr>
+              <a:t>Pros:</a:t>
+            </a:r>
+          </a:p>
+          <a:p>
+            <a:endParaRPr lang="en-US" sz="1050" dirty="0">
+              <a:latin typeface="+mj-lt"/>
+            </a:endParaRPr>
+          </a:p>
+          <a:p>
+            <a:endParaRPr lang="en-US" sz="1050" dirty="0">
+              <a:latin typeface="+mj-lt"/>
+            </a:endParaRPr>
+          </a:p>
+          <a:p>
+            <a:endParaRPr lang="en-US" sz="1050" dirty="0">
+              <a:latin typeface="+mj-lt"/>
+            </a:endParaRPr>
+          </a:p>
+          <a:p>
+            <a:endParaRPr lang="en-US" sz="1050" dirty="0">
+              <a:latin typeface="+mj-lt"/>
+            </a:endParaRPr>
+          </a:p>
+          <a:p>
+            <a:r>
+              <a:rPr lang="en-US" sz="1050" dirty="0">
+                <a:latin typeface="+mj-lt"/>
+              </a:rPr>
+              <a:t>Cons:</a:t>
+            </a:r>
+          </a:p>
+        </p:txBody>
+      </p:sp>
+      <p:sp>
+        <p:nvSpPr>
+          <p:cNvPr id="15" name="Rectangle 14">
+            <a:extLst>
+              <a:ext uri="{FF2B5EF4-FFF2-40B4-BE49-F238E27FC236}">
+                <a16:creationId xmlns:a16="http://schemas.microsoft.com/office/drawing/2014/main" id="{138D00ED-B376-47A4-B765-B4B625F00BAD}"/>
+              </a:ext>
+            </a:extLst>
+          </p:cNvPr>
+          <p:cNvSpPr/>
+          <p:nvPr/>
+        </p:nvSpPr>
+        <p:spPr>
+          <a:xfrm rot="10800000" flipV="1">
+            <a:off x="7160134" y="5029720"/>
+            <a:ext cx="5031866" cy="1061829"/>
+          </a:xfrm>
+          <a:prstGeom prst="rect">
+            <a:avLst/>
+          </a:prstGeom>
+        </p:spPr>
+        <p:txBody>
+          <a:bodyPr wrap="square">
+            <a:spAutoFit/>
+          </a:bodyPr>
+          <a:lstStyle/>
+          <a:p>
+            <a:r>
+              <a:rPr lang="en-US" sz="1050" dirty="0">
+                <a:latin typeface="+mj-lt"/>
+              </a:rPr>
+              <a:t>Pros:</a:t>
+            </a:r>
+          </a:p>
+          <a:p>
+            <a:endParaRPr lang="en-US" sz="1050" dirty="0">
+              <a:latin typeface="+mj-lt"/>
+            </a:endParaRPr>
+          </a:p>
+          <a:p>
+            <a:endParaRPr lang="en-US" sz="1050" dirty="0">
+              <a:latin typeface="+mj-lt"/>
+            </a:endParaRPr>
+          </a:p>
+          <a:p>
+            <a:endParaRPr lang="en-US" sz="1050" dirty="0">
+              <a:latin typeface="+mj-lt"/>
+            </a:endParaRPr>
+          </a:p>
+          <a:p>
+            <a:endParaRPr lang="en-US" sz="1050" dirty="0">
+              <a:latin typeface="+mj-lt"/>
+            </a:endParaRPr>
+          </a:p>
+          <a:p>
+            <a:r>
+              <a:rPr lang="en-US" sz="1050" dirty="0">
+                <a:latin typeface="+mj-lt"/>
+              </a:rPr>
+              <a:t>Cons:</a:t>
+            </a:r>
+          </a:p>
+        </p:txBody>
+      </p:sp>
+    </p:spTree>
+    <p:extLst>
+      <p:ext uri="{BB962C8B-B14F-4D97-AF65-F5344CB8AC3E}">
+        <p14:creationId xmlns:p14="http://schemas.microsoft.com/office/powerpoint/2010/main" val="3144269478"/>
+      </p:ext>
+    </p:extLst>
+  </p:cSld>
+  <p:clrMapOvr>
+    <a:masterClrMapping/>
+  </p:clrMapOvr>
+</p:sld>
+</file>
+
+<file path=ppt/slides/slide9.xml><?xml version="1.0" encoding="utf-8"?>
+<p:sld xmlns:a="http://schemas.openxmlformats.org/drawingml/2006/main" xmlns:r="http://schemas.openxmlformats.org/officeDocument/2006/relationships" xmlns:p="http://schemas.openxmlformats.org/presentationml/2006/main">
+  <p:cSld>
+    <p:spTree>
+      <p:nvGrpSpPr>
+        <p:cNvPr id="1" name=""/>
+        <p:cNvGrpSpPr/>
+        <p:nvPr/>
+      </p:nvGrpSpPr>
+      <p:grpSpPr>
+        <a:xfrm>
+          <a:off x="0" y="0"/>
+          <a:ext cx="0" cy="0"/>
+          <a:chOff x="0" y="0"/>
+          <a:chExt cx="0" cy="0"/>
+        </a:xfrm>
+      </p:grpSpPr>
+      <p:sp>
+        <p:nvSpPr>
+          <p:cNvPr id="2" name="Title 1">
+            <a:extLst>
+              <a:ext uri="{FF2B5EF4-FFF2-40B4-BE49-F238E27FC236}">
+                <a16:creationId xmlns:a16="http://schemas.microsoft.com/office/drawing/2014/main" id="{0D157F11-29CC-473A-B5A3-CC53D182D2B8}"/>
+              </a:ext>
+            </a:extLst>
+          </p:cNvPr>
+          <p:cNvSpPr>
+            <a:spLocks noGrp="1"/>
+          </p:cNvSpPr>
+          <p:nvPr>
+            <p:ph type="title"/>
+          </p:nvPr>
+        </p:nvSpPr>
+        <p:spPr/>
+        <p:txBody>
+          <a:bodyPr>
+            <a:normAutofit fontScale="90000"/>
+          </a:bodyPr>
+          <a:lstStyle/>
+          <a:p>
+            <a:r>
+              <a:rPr lang="en-AU" dirty="0"/>
+              <a:t>Data driver framework – A walkthrough</a:t>
+            </a:r>
+          </a:p>
+        </p:txBody>
+      </p:sp>
+    </p:spTree>
+    <p:extLst>
+      <p:ext uri="{BB962C8B-B14F-4D97-AF65-F5344CB8AC3E}">
+        <p14:creationId xmlns:p14="http://schemas.microsoft.com/office/powerpoint/2010/main" val="4055588053"/>
       </p:ext>
     </p:extLst>
   </p:cSld>

</xml_diff>